<commit_message>
Refactoring power point presentation
</commit_message>
<xml_diff>
--- a/F1Track_Presentation.pptx
+++ b/F1Track_Presentation.pptx
@@ -5,36 +5,45 @@
     <p:sldMasterId id="2147483676" r:id="rId1"/>
   </p:sldMasterIdLst>
   <p:notesMasterIdLst>
-    <p:notesMasterId r:id="rId15"/>
+    <p:notesMasterId r:id="rId17"/>
   </p:notesMasterIdLst>
   <p:sldIdLst>
     <p:sldId id="256" r:id="rId2"/>
     <p:sldId id="306" r:id="rId3"/>
-    <p:sldId id="274" r:id="rId4"/>
-    <p:sldId id="260" r:id="rId5"/>
-    <p:sldId id="304" r:id="rId6"/>
-    <p:sldId id="305" r:id="rId7"/>
-    <p:sldId id="268" r:id="rId8"/>
-    <p:sldId id="303" r:id="rId9"/>
-    <p:sldId id="307" r:id="rId10"/>
-    <p:sldId id="309" r:id="rId11"/>
-    <p:sldId id="310" r:id="rId12"/>
-    <p:sldId id="312" r:id="rId13"/>
-    <p:sldId id="313" r:id="rId14"/>
+    <p:sldId id="315" r:id="rId4"/>
+    <p:sldId id="274" r:id="rId5"/>
+    <p:sldId id="260" r:id="rId6"/>
+    <p:sldId id="304" r:id="rId7"/>
+    <p:sldId id="305" r:id="rId8"/>
+    <p:sldId id="268" r:id="rId9"/>
+    <p:sldId id="314" r:id="rId10"/>
+    <p:sldId id="303" r:id="rId11"/>
+    <p:sldId id="307" r:id="rId12"/>
+    <p:sldId id="309" r:id="rId13"/>
+    <p:sldId id="310" r:id="rId14"/>
+    <p:sldId id="312" r:id="rId15"/>
+    <p:sldId id="313" r:id="rId16"/>
   </p:sldIdLst>
   <p:sldSz cx="9144000" cy="5143500" type="screen16x9"/>
   <p:notesSz cx="6858000" cy="9144000"/>
   <p:embeddedFontLst>
     <p:embeddedFont>
       <p:font typeface="Jost" panose="020B0604020202020204" charset="0"/>
-      <p:regular r:id="rId16"/>
-      <p:bold r:id="rId17"/>
-      <p:italic r:id="rId18"/>
-      <p:boldItalic r:id="rId19"/>
+      <p:regular r:id="rId18"/>
+      <p:bold r:id="rId19"/>
+      <p:italic r:id="rId20"/>
+      <p:boldItalic r:id="rId21"/>
     </p:embeddedFont>
     <p:embeddedFont>
       <p:font typeface="Krona One" panose="020B0604020202020204" charset="0"/>
-      <p:regular r:id="rId20"/>
+      <p:regular r:id="rId22"/>
+    </p:embeddedFont>
+    <p:embeddedFont>
+      <p:font typeface="Lato" panose="020F0502020204030203" pitchFamily="34" charset="0"/>
+      <p:regular r:id="rId23"/>
+      <p:bold r:id="rId24"/>
+      <p:italic r:id="rId25"/>
+      <p:boldItalic r:id="rId26"/>
     </p:embeddedFont>
   </p:embeddedFontLst>
   <p:defaultTextStyle>
@@ -277,10 +286,7 @@
 <file path=ppt/revisionInfo.xml><?xml version="1.0" encoding="utf-8"?>
 <p1510:revInfo xmlns:a="http://schemas.openxmlformats.org/drawingml/2006/main" xmlns:r="http://schemas.openxmlformats.org/officeDocument/2006/relationships" xmlns:p1510="http://schemas.microsoft.com/office/powerpoint/2015/10/main">
   <p1510:revLst>
-    <p1510:client id="{45D11CCF-ECC2-4ED6-9D05-DE91D7E3F58D}" v="3" dt="2023-06-22T13:32:45.645"/>
-    <p1510:client id="{B04410F8-4D6B-4DD2-B321-A324862B9A98}" v="794" dt="2023-06-22T10:10:14.046"/>
-    <p1510:client id="{BA4FE7F0-8987-33DF-719A-88D5CE30C910}" v="26" dt="2023-06-22T13:28:02.544"/>
-    <p1510:client id="{C3EB18C4-D845-D297-A21A-43918BB230A2}" v="6" dt="2023-06-22T12:58:40.403"/>
+    <p1510:client id="{45D11CCF-ECC2-4ED6-9D05-DE91D7E3F58D}" v="1245" dt="2023-06-25T16:14:04.070"/>
   </p1510:revLst>
 </p1510:revInfo>
 </file>
@@ -922,14 +928,18 @@
               </a:spcAft>
               <a:buNone/>
             </a:pPr>
-            <a:endParaRPr/>
+            <a:r>
+              <a:rPr lang="it-IT" dirty="0"/>
+              <a:t>Infatti, nel nostro caso avevamo nelle varie istanze, dei campi con valori nulli ed erano contrassegnati con \N. Quindi, quello che abbiamo fatto è stato rimuovere completamente il campo in  questione per quell’istanza (mettendo stringa vuota)</a:t>
+            </a:r>
+            <a:endParaRPr dirty="0"/>
           </a:p>
         </p:txBody>
       </p:sp>
     </p:spTree>
     <p:extLst>
       <p:ext uri="{BB962C8B-B14F-4D97-AF65-F5344CB8AC3E}">
-        <p14:creationId xmlns:p14="http://schemas.microsoft.com/office/powerpoint/2010/main" val="3232335322"/>
+        <p14:creationId xmlns:p14="http://schemas.microsoft.com/office/powerpoint/2010/main" val="2181214212"/>
       </p:ext>
     </p:extLst>
   </p:cSld>
@@ -1031,14 +1041,38 @@
               </a:spcAft>
               <a:buNone/>
             </a:pPr>
-            <a:endParaRPr/>
+            <a:r>
+              <a:rPr lang="it-IT" dirty="0"/>
+              <a:t>Successivamente abbiamo importato i vari csv in </a:t>
+            </a:r>
+            <a:r>
+              <a:rPr lang="it-IT" dirty="0" err="1"/>
+              <a:t>MongoDB</a:t>
+            </a:r>
+            <a:r>
+              <a:rPr lang="it-IT" dirty="0"/>
+              <a:t> utilizzando </a:t>
+            </a:r>
+            <a:r>
+              <a:rPr lang="it-IT" dirty="0" err="1"/>
+              <a:t>MongoDB</a:t>
+            </a:r>
+            <a:r>
+              <a:rPr lang="it-IT" dirty="0"/>
+              <a:t> </a:t>
+            </a:r>
+            <a:r>
+              <a:rPr lang="it-IT" dirty="0" err="1"/>
+              <a:t>Compass</a:t>
+            </a:r>
+            <a:endParaRPr dirty="0"/>
           </a:p>
         </p:txBody>
       </p:sp>
     </p:spTree>
     <p:extLst>
       <p:ext uri="{BB962C8B-B14F-4D97-AF65-F5344CB8AC3E}">
-        <p14:creationId xmlns:p14="http://schemas.microsoft.com/office/powerpoint/2010/main" val="1403733406"/>
+        <p14:creationId xmlns:p14="http://schemas.microsoft.com/office/powerpoint/2010/main" val="253875652"/>
       </p:ext>
     </p:extLst>
   </p:cSld>
@@ -1147,6 +1181,236 @@
     </p:spTree>
     <p:extLst>
       <p:ext uri="{BB962C8B-B14F-4D97-AF65-F5344CB8AC3E}">
+        <p14:creationId xmlns:p14="http://schemas.microsoft.com/office/powerpoint/2010/main" val="3232335322"/>
+      </p:ext>
+    </p:extLst>
+  </p:cSld>
+  <p:clrMapOvr>
+    <a:masterClrMapping/>
+  </p:clrMapOvr>
+</p:notes>
+</file>
+
+<file path=ppt/notesSlides/notesSlide13.xml><?xml version="1.0" encoding="utf-8"?>
+<p:notes xmlns:a="http://schemas.openxmlformats.org/drawingml/2006/main" xmlns:r="http://schemas.openxmlformats.org/officeDocument/2006/relationships" xmlns:p="http://schemas.openxmlformats.org/presentationml/2006/main" showMasterSp="0" showMasterPhAnim="0">
+  <p:cSld>
+    <p:spTree>
+      <p:nvGrpSpPr>
+        <p:cNvPr id="1" name="Shape 1449"/>
+        <p:cNvGrpSpPr/>
+        <p:nvPr/>
+      </p:nvGrpSpPr>
+      <p:grpSpPr>
+        <a:xfrm>
+          <a:off x="0" y="0"/>
+          <a:ext cx="0" cy="0"/>
+          <a:chOff x="0" y="0"/>
+          <a:chExt cx="0" cy="0"/>
+        </a:xfrm>
+      </p:grpSpPr>
+      <p:sp>
+        <p:nvSpPr>
+          <p:cNvPr id="1450" name="Google Shape;1450;g11b20512f71_0_1237:notes"/>
+          <p:cNvSpPr>
+            <a:spLocks noGrp="1" noRot="1" noChangeAspect="1"/>
+          </p:cNvSpPr>
+          <p:nvPr>
+            <p:ph type="sldImg" idx="2"/>
+          </p:nvPr>
+        </p:nvSpPr>
+        <p:spPr>
+          <a:xfrm>
+            <a:off x="381000" y="685800"/>
+            <a:ext cx="6096000" cy="3429000"/>
+          </a:xfrm>
+          <a:custGeom>
+            <a:avLst/>
+            <a:gdLst/>
+            <a:ahLst/>
+            <a:cxnLst/>
+            <a:rect l="l" t="t" r="r" b="b"/>
+            <a:pathLst>
+              <a:path w="120000" h="120000" extrusionOk="0">
+                <a:moveTo>
+                  <a:pt x="0" y="0"/>
+                </a:moveTo>
+                <a:lnTo>
+                  <a:pt x="120000" y="0"/>
+                </a:lnTo>
+                <a:lnTo>
+                  <a:pt x="120000" y="120000"/>
+                </a:lnTo>
+                <a:lnTo>
+                  <a:pt x="0" y="120000"/>
+                </a:lnTo>
+                <a:close/>
+              </a:path>
+            </a:pathLst>
+          </a:custGeom>
+        </p:spPr>
+      </p:sp>
+      <p:sp>
+        <p:nvSpPr>
+          <p:cNvPr id="1451" name="Google Shape;1451;g11b20512f71_0_1237:notes"/>
+          <p:cNvSpPr txBox="1">
+            <a:spLocks noGrp="1"/>
+          </p:cNvSpPr>
+          <p:nvPr>
+            <p:ph type="body" idx="1"/>
+          </p:nvPr>
+        </p:nvSpPr>
+        <p:spPr>
+          <a:xfrm>
+            <a:off x="685800" y="4343400"/>
+            <a:ext cx="5486400" cy="4114800"/>
+          </a:xfrm>
+          <a:prstGeom prst="rect">
+            <a:avLst/>
+          </a:prstGeom>
+        </p:spPr>
+        <p:txBody>
+          <a:bodyPr spcFirstLastPara="1" wrap="square" lIns="91425" tIns="91425" rIns="91425" bIns="91425" anchor="t" anchorCtr="0">
+            <a:noAutofit/>
+          </a:bodyPr>
+          <a:lstStyle/>
+          <a:p>
+            <a:pPr marL="0" lvl="0" indent="0" algn="l" rtl="0">
+              <a:spcBef>
+                <a:spcPts val="0"/>
+              </a:spcBef>
+              <a:spcAft>
+                <a:spcPts val="0"/>
+              </a:spcAft>
+              <a:buNone/>
+            </a:pPr>
+            <a:r>
+              <a:rPr lang="it-IT" dirty="0"/>
+              <a:t>Infine, abbiamo sviluppato una </a:t>
+            </a:r>
+            <a:r>
+              <a:rPr lang="it-IT" dirty="0" err="1"/>
+              <a:t>Webapp</a:t>
+            </a:r>
+            <a:r>
+              <a:rPr lang="it-IT" dirty="0"/>
+              <a:t> in Python in modo da poter interagire con il DB.  Ora passiamo alla demo.</a:t>
+            </a:r>
+            <a:endParaRPr dirty="0"/>
+          </a:p>
+        </p:txBody>
+      </p:sp>
+    </p:spTree>
+    <p:extLst>
+      <p:ext uri="{BB962C8B-B14F-4D97-AF65-F5344CB8AC3E}">
+        <p14:creationId xmlns:p14="http://schemas.microsoft.com/office/powerpoint/2010/main" val="1403733406"/>
+      </p:ext>
+    </p:extLst>
+  </p:cSld>
+  <p:clrMapOvr>
+    <a:masterClrMapping/>
+  </p:clrMapOvr>
+</p:notes>
+</file>
+
+<file path=ppt/notesSlides/notesSlide14.xml><?xml version="1.0" encoding="utf-8"?>
+<p:notes xmlns:a="http://schemas.openxmlformats.org/drawingml/2006/main" xmlns:r="http://schemas.openxmlformats.org/officeDocument/2006/relationships" xmlns:p="http://schemas.openxmlformats.org/presentationml/2006/main" showMasterSp="0" showMasterPhAnim="0">
+  <p:cSld>
+    <p:spTree>
+      <p:nvGrpSpPr>
+        <p:cNvPr id="1" name="Shape 1449"/>
+        <p:cNvGrpSpPr/>
+        <p:nvPr/>
+      </p:nvGrpSpPr>
+      <p:grpSpPr>
+        <a:xfrm>
+          <a:off x="0" y="0"/>
+          <a:ext cx="0" cy="0"/>
+          <a:chOff x="0" y="0"/>
+          <a:chExt cx="0" cy="0"/>
+        </a:xfrm>
+      </p:grpSpPr>
+      <p:sp>
+        <p:nvSpPr>
+          <p:cNvPr id="1450" name="Google Shape;1450;g11b20512f71_0_1237:notes"/>
+          <p:cNvSpPr>
+            <a:spLocks noGrp="1" noRot="1" noChangeAspect="1"/>
+          </p:cNvSpPr>
+          <p:nvPr>
+            <p:ph type="sldImg" idx="2"/>
+          </p:nvPr>
+        </p:nvSpPr>
+        <p:spPr>
+          <a:xfrm>
+            <a:off x="381000" y="685800"/>
+            <a:ext cx="6096000" cy="3429000"/>
+          </a:xfrm>
+          <a:custGeom>
+            <a:avLst/>
+            <a:gdLst/>
+            <a:ahLst/>
+            <a:cxnLst/>
+            <a:rect l="l" t="t" r="r" b="b"/>
+            <a:pathLst>
+              <a:path w="120000" h="120000" extrusionOk="0">
+                <a:moveTo>
+                  <a:pt x="0" y="0"/>
+                </a:moveTo>
+                <a:lnTo>
+                  <a:pt x="120000" y="0"/>
+                </a:lnTo>
+                <a:lnTo>
+                  <a:pt x="120000" y="120000"/>
+                </a:lnTo>
+                <a:lnTo>
+                  <a:pt x="0" y="120000"/>
+                </a:lnTo>
+                <a:close/>
+              </a:path>
+            </a:pathLst>
+          </a:custGeom>
+        </p:spPr>
+      </p:sp>
+      <p:sp>
+        <p:nvSpPr>
+          <p:cNvPr id="1451" name="Google Shape;1451;g11b20512f71_0_1237:notes"/>
+          <p:cNvSpPr txBox="1">
+            <a:spLocks noGrp="1"/>
+          </p:cNvSpPr>
+          <p:nvPr>
+            <p:ph type="body" idx="1"/>
+          </p:nvPr>
+        </p:nvSpPr>
+        <p:spPr>
+          <a:xfrm>
+            <a:off x="685800" y="4343400"/>
+            <a:ext cx="5486400" cy="4114800"/>
+          </a:xfrm>
+          <a:prstGeom prst="rect">
+            <a:avLst/>
+          </a:prstGeom>
+        </p:spPr>
+        <p:txBody>
+          <a:bodyPr spcFirstLastPara="1" wrap="square" lIns="91425" tIns="91425" rIns="91425" bIns="91425" anchor="t" anchorCtr="0">
+            <a:noAutofit/>
+          </a:bodyPr>
+          <a:lstStyle/>
+          <a:p>
+            <a:pPr marL="0" lvl="0" indent="0" algn="l" rtl="0">
+              <a:spcBef>
+                <a:spcPts val="0"/>
+              </a:spcBef>
+              <a:spcAft>
+                <a:spcPts val="0"/>
+              </a:spcAft>
+              <a:buNone/>
+            </a:pPr>
+            <a:endParaRPr/>
+          </a:p>
+        </p:txBody>
+      </p:sp>
+    </p:spTree>
+    <p:extLst>
+      <p:ext uri="{BB962C8B-B14F-4D97-AF65-F5344CB8AC3E}">
         <p14:creationId xmlns:p14="http://schemas.microsoft.com/office/powerpoint/2010/main" val="1148991977"/>
       </p:ext>
     </p:extLst>
@@ -1157,7 +1421,7 @@
 </p:notes>
 </file>
 
-<file path=ppt/notesSlides/notesSlide13.xml><?xml version="1.0" encoding="utf-8"?>
+<file path=ppt/notesSlides/notesSlide15.xml><?xml version="1.0" encoding="utf-8"?>
 <p:notes xmlns:a="http://schemas.openxmlformats.org/drawingml/2006/main" xmlns:r="http://schemas.openxmlformats.org/officeDocument/2006/relationships" xmlns:p="http://schemas.openxmlformats.org/presentationml/2006/main" showMasterSp="0" showMasterPhAnim="0">
   <p:cSld>
     <p:spTree>
@@ -1349,6 +1613,39 @@
           </a:bodyPr>
           <a:lstStyle/>
           <a:p>
+            <a:pPr marL="0" marR="0" lvl="0" indent="0" algn="l" defTabSz="914400" rtl="0" eaLnBrk="1" fontAlgn="auto" latinLnBrk="0" hangingPunct="1">
+              <a:lnSpc>
+                <a:spcPct val="100000"/>
+              </a:lnSpc>
+              <a:spcBef>
+                <a:spcPts val="0"/>
+              </a:spcBef>
+              <a:spcAft>
+                <a:spcPts val="0"/>
+              </a:spcAft>
+              <a:buClr>
+                <a:srgbClr val="000000"/>
+              </a:buClr>
+              <a:buSzPts val="1100"/>
+              <a:buFont typeface="Arial"/>
+              <a:buNone/>
+              <a:tabLst/>
+              <a:defRPr/>
+            </a:pPr>
+            <a:r>
+              <a:rPr lang="it-IT" dirty="0"/>
+              <a:t>Per poter organizzare le attività di sviluppo del progetto abbiamo utilizzato </a:t>
+            </a:r>
+            <a:r>
+              <a:rPr lang="it-IT" dirty="0" err="1"/>
+              <a:t>Trello</a:t>
+            </a:r>
+            <a:r>
+              <a:rPr lang="it-IT" dirty="0"/>
+              <a:t> che ci consente di definire i task, le scadenze e assegnare i task</a:t>
+            </a:r>
+          </a:p>
+          <a:p>
             <a:pPr marL="0" lvl="0" indent="0" algn="l" rtl="0">
               <a:spcBef>
                 <a:spcPts val="0"/>
@@ -1358,7 +1655,7 @@
               </a:spcAft>
               <a:buNone/>
             </a:pPr>
-            <a:endParaRPr/>
+            <a:endParaRPr dirty="0"/>
           </a:p>
         </p:txBody>
       </p:sp>
@@ -1376,6 +1673,148 @@
 </file>
 
 <file path=ppt/notesSlides/notesSlide3.xml><?xml version="1.0" encoding="utf-8"?>
+<p:notes xmlns:a="http://schemas.openxmlformats.org/drawingml/2006/main" xmlns:r="http://schemas.openxmlformats.org/officeDocument/2006/relationships" xmlns:p="http://schemas.openxmlformats.org/presentationml/2006/main" showMasterSp="0" showMasterPhAnim="0">
+  <p:cSld>
+    <p:spTree>
+      <p:nvGrpSpPr>
+        <p:cNvPr id="1" name="Shape 1449"/>
+        <p:cNvGrpSpPr/>
+        <p:nvPr/>
+      </p:nvGrpSpPr>
+      <p:grpSpPr>
+        <a:xfrm>
+          <a:off x="0" y="0"/>
+          <a:ext cx="0" cy="0"/>
+          <a:chOff x="0" y="0"/>
+          <a:chExt cx="0" cy="0"/>
+        </a:xfrm>
+      </p:grpSpPr>
+      <p:sp>
+        <p:nvSpPr>
+          <p:cNvPr id="1450" name="Google Shape;1450;g11b20512f71_0_1237:notes"/>
+          <p:cNvSpPr>
+            <a:spLocks noGrp="1" noRot="1" noChangeAspect="1"/>
+          </p:cNvSpPr>
+          <p:nvPr>
+            <p:ph type="sldImg" idx="2"/>
+          </p:nvPr>
+        </p:nvSpPr>
+        <p:spPr>
+          <a:xfrm>
+            <a:off x="381000" y="685800"/>
+            <a:ext cx="6096000" cy="3429000"/>
+          </a:xfrm>
+          <a:custGeom>
+            <a:avLst/>
+            <a:gdLst/>
+            <a:ahLst/>
+            <a:cxnLst/>
+            <a:rect l="l" t="t" r="r" b="b"/>
+            <a:pathLst>
+              <a:path w="120000" h="120000" extrusionOk="0">
+                <a:moveTo>
+                  <a:pt x="0" y="0"/>
+                </a:moveTo>
+                <a:lnTo>
+                  <a:pt x="120000" y="0"/>
+                </a:lnTo>
+                <a:lnTo>
+                  <a:pt x="120000" y="120000"/>
+                </a:lnTo>
+                <a:lnTo>
+                  <a:pt x="0" y="120000"/>
+                </a:lnTo>
+                <a:close/>
+              </a:path>
+            </a:pathLst>
+          </a:custGeom>
+        </p:spPr>
+      </p:sp>
+      <p:sp>
+        <p:nvSpPr>
+          <p:cNvPr id="1451" name="Google Shape;1451;g11b20512f71_0_1237:notes"/>
+          <p:cNvSpPr txBox="1">
+            <a:spLocks noGrp="1"/>
+          </p:cNvSpPr>
+          <p:nvPr>
+            <p:ph type="body" idx="1"/>
+          </p:nvPr>
+        </p:nvSpPr>
+        <p:spPr>
+          <a:xfrm>
+            <a:off x="685800" y="4343400"/>
+            <a:ext cx="5486400" cy="4114800"/>
+          </a:xfrm>
+          <a:prstGeom prst="rect">
+            <a:avLst/>
+          </a:prstGeom>
+        </p:spPr>
+        <p:txBody>
+          <a:bodyPr spcFirstLastPara="1" wrap="square" lIns="91425" tIns="91425" rIns="91425" bIns="91425" anchor="t" anchorCtr="0">
+            <a:noAutofit/>
+          </a:bodyPr>
+          <a:lstStyle/>
+          <a:p>
+            <a:pPr marL="0" marR="0" lvl="0" indent="0" algn="l" defTabSz="914400" rtl="0" eaLnBrk="1" fontAlgn="auto" latinLnBrk="0" hangingPunct="1">
+              <a:lnSpc>
+                <a:spcPct val="100000"/>
+              </a:lnSpc>
+              <a:spcBef>
+                <a:spcPts val="0"/>
+              </a:spcBef>
+              <a:spcAft>
+                <a:spcPts val="0"/>
+              </a:spcAft>
+              <a:buClr>
+                <a:srgbClr val="000000"/>
+              </a:buClr>
+              <a:buSzPts val="1100"/>
+              <a:buFont typeface="Arial"/>
+              <a:buNone/>
+              <a:tabLst/>
+              <a:defRPr/>
+            </a:pPr>
+            <a:r>
+              <a:rPr lang="it-IT" dirty="0"/>
+              <a:t>Per poter sviluppare il progetto in contemporanea e per mantenere il </a:t>
+            </a:r>
+            <a:r>
+              <a:rPr lang="it-IT" dirty="0" err="1"/>
+              <a:t>versioning</a:t>
+            </a:r>
+            <a:r>
+              <a:rPr lang="it-IT" dirty="0"/>
+              <a:t> del progetto abbiamo usato GitHub</a:t>
+            </a:r>
+          </a:p>
+          <a:p>
+            <a:pPr marL="0" lvl="0" indent="0" algn="l" rtl="0">
+              <a:spcBef>
+                <a:spcPts val="0"/>
+              </a:spcBef>
+              <a:spcAft>
+                <a:spcPts val="0"/>
+              </a:spcAft>
+              <a:buNone/>
+            </a:pPr>
+            <a:endParaRPr dirty="0"/>
+          </a:p>
+        </p:txBody>
+      </p:sp>
+    </p:spTree>
+    <p:extLst>
+      <p:ext uri="{BB962C8B-B14F-4D97-AF65-F5344CB8AC3E}">
+        <p14:creationId xmlns:p14="http://schemas.microsoft.com/office/powerpoint/2010/main" val="3509966107"/>
+      </p:ext>
+    </p:extLst>
+  </p:cSld>
+  <p:clrMapOvr>
+    <a:masterClrMapping/>
+  </p:clrMapOvr>
+</p:notes>
+</file>
+
+<file path=ppt/notesSlides/notesSlide4.xml><?xml version="1.0" encoding="utf-8"?>
 <p:notes xmlns:a="http://schemas.openxmlformats.org/drawingml/2006/main" xmlns:r="http://schemas.openxmlformats.org/officeDocument/2006/relationships" xmlns:p="http://schemas.openxmlformats.org/presentationml/2006/main" showMasterSp="0" showMasterPhAnim="0">
   <p:cSld>
     <p:spTree>
@@ -1458,6 +1897,31 @@
           </a:bodyPr>
           <a:lstStyle/>
           <a:p>
+            <a:pPr marL="0" marR="0" lvl="0" indent="0" algn="l" defTabSz="914400" rtl="0" eaLnBrk="1" fontAlgn="auto" latinLnBrk="0" hangingPunct="1">
+              <a:lnSpc>
+                <a:spcPct val="100000"/>
+              </a:lnSpc>
+              <a:spcBef>
+                <a:spcPts val="0"/>
+              </a:spcBef>
+              <a:spcAft>
+                <a:spcPts val="0"/>
+              </a:spcAft>
+              <a:buClr>
+                <a:srgbClr val="000000"/>
+              </a:buClr>
+              <a:buSzPts val="1100"/>
+              <a:buFont typeface="Arial"/>
+              <a:buNone/>
+              <a:tabLst/>
+              <a:defRPr/>
+            </a:pPr>
+            <a:r>
+              <a:rPr lang="it-IT" dirty="0"/>
+              <a:t>Quindi gli step che abbiamo seguito per realizzare il progetto sono:</a:t>
+            </a:r>
+          </a:p>
+          <a:p>
             <a:pPr marL="0" lvl="0" indent="0" algn="l" rtl="0">
               <a:spcBef>
                 <a:spcPts val="0"/>
@@ -1467,111 +1931,7 @@
               </a:spcAft>
               <a:buNone/>
             </a:pPr>
-            <a:endParaRPr/>
-          </a:p>
-        </p:txBody>
-      </p:sp>
-    </p:spTree>
-  </p:cSld>
-  <p:clrMapOvr>
-    <a:masterClrMapping/>
-  </p:clrMapOvr>
-</p:notes>
-</file>
-
-<file path=ppt/notesSlides/notesSlide4.xml><?xml version="1.0" encoding="utf-8"?>
-<p:notes xmlns:a="http://schemas.openxmlformats.org/drawingml/2006/main" xmlns:r="http://schemas.openxmlformats.org/officeDocument/2006/relationships" xmlns:p="http://schemas.openxmlformats.org/presentationml/2006/main" showMasterSp="0" showMasterPhAnim="0">
-  <p:cSld>
-    <p:spTree>
-      <p:nvGrpSpPr>
-        <p:cNvPr id="1" name="Shape 1449"/>
-        <p:cNvGrpSpPr/>
-        <p:nvPr/>
-      </p:nvGrpSpPr>
-      <p:grpSpPr>
-        <a:xfrm>
-          <a:off x="0" y="0"/>
-          <a:ext cx="0" cy="0"/>
-          <a:chOff x="0" y="0"/>
-          <a:chExt cx="0" cy="0"/>
-        </a:xfrm>
-      </p:grpSpPr>
-      <p:sp>
-        <p:nvSpPr>
-          <p:cNvPr id="1450" name="Google Shape;1450;g11b20512f71_0_1237:notes"/>
-          <p:cNvSpPr>
-            <a:spLocks noGrp="1" noRot="1" noChangeAspect="1"/>
-          </p:cNvSpPr>
-          <p:nvPr>
-            <p:ph type="sldImg" idx="2"/>
-          </p:nvPr>
-        </p:nvSpPr>
-        <p:spPr>
-          <a:xfrm>
-            <a:off x="381000" y="685800"/>
-            <a:ext cx="6096000" cy="3429000"/>
-          </a:xfrm>
-          <a:custGeom>
-            <a:avLst/>
-            <a:gdLst/>
-            <a:ahLst/>
-            <a:cxnLst/>
-            <a:rect l="l" t="t" r="r" b="b"/>
-            <a:pathLst>
-              <a:path w="120000" h="120000" extrusionOk="0">
-                <a:moveTo>
-                  <a:pt x="0" y="0"/>
-                </a:moveTo>
-                <a:lnTo>
-                  <a:pt x="120000" y="0"/>
-                </a:lnTo>
-                <a:lnTo>
-                  <a:pt x="120000" y="120000"/>
-                </a:lnTo>
-                <a:lnTo>
-                  <a:pt x="0" y="120000"/>
-                </a:lnTo>
-                <a:close/>
-              </a:path>
-            </a:pathLst>
-          </a:custGeom>
-        </p:spPr>
-      </p:sp>
-      <p:sp>
-        <p:nvSpPr>
-          <p:cNvPr id="1451" name="Google Shape;1451;g11b20512f71_0_1237:notes"/>
-          <p:cNvSpPr txBox="1">
-            <a:spLocks noGrp="1"/>
-          </p:cNvSpPr>
-          <p:nvPr>
-            <p:ph type="body" idx="1"/>
-          </p:nvPr>
-        </p:nvSpPr>
-        <p:spPr>
-          <a:xfrm>
-            <a:off x="685800" y="4343400"/>
-            <a:ext cx="5486400" cy="4114800"/>
-          </a:xfrm>
-          <a:prstGeom prst="rect">
-            <a:avLst/>
-          </a:prstGeom>
-        </p:spPr>
-        <p:txBody>
-          <a:bodyPr spcFirstLastPara="1" wrap="square" lIns="91425" tIns="91425" rIns="91425" bIns="91425" anchor="t" anchorCtr="0">
-            <a:noAutofit/>
-          </a:bodyPr>
-          <a:lstStyle/>
-          <a:p>
-            <a:pPr marL="0" lvl="0" indent="0" algn="l" rtl="0">
-              <a:spcBef>
-                <a:spcPts val="0"/>
-              </a:spcBef>
-              <a:spcAft>
-                <a:spcPts val="0"/>
-              </a:spcAft>
-              <a:buNone/>
-            </a:pPr>
-            <a:endParaRPr/>
+            <a:endParaRPr dirty="0"/>
           </a:p>
         </p:txBody>
       </p:sp>
@@ -1666,25 +2026,33 @@
           </a:bodyPr>
           <a:lstStyle/>
           <a:p>
-            <a:pPr marL="0" lvl="0" indent="0" algn="l" rtl="0">
-              <a:spcBef>
-                <a:spcPts val="0"/>
-              </a:spcBef>
-              <a:spcAft>
-                <a:spcPts val="0"/>
-              </a:spcAft>
+            <a:pPr marL="0" marR="0" lvl="0" indent="0" algn="l" defTabSz="914400" rtl="0" eaLnBrk="1" fontAlgn="auto" latinLnBrk="0" hangingPunct="1">
+              <a:lnSpc>
+                <a:spcPct val="100000"/>
+              </a:lnSpc>
+              <a:spcBef>
+                <a:spcPts val="0"/>
+              </a:spcBef>
+              <a:spcAft>
+                <a:spcPts val="0"/>
+              </a:spcAft>
+              <a:buClr>
+                <a:srgbClr val="000000"/>
+              </a:buClr>
+              <a:buSzPts val="1100"/>
+              <a:buFont typeface="Arial"/>
               <a:buNone/>
+              <a:tabLst/>
+              <a:defRPr/>
             </a:pPr>
-            <a:endParaRPr/>
+            <a:r>
+              <a:rPr lang="it-IT" dirty="0"/>
+              <a:t>Il primo step è stato quello di trovare i dati necessari per la nostra idea di progetto</a:t>
+            </a:r>
           </a:p>
         </p:txBody>
       </p:sp>
     </p:spTree>
-    <p:extLst>
-      <p:ext uri="{BB962C8B-B14F-4D97-AF65-F5344CB8AC3E}">
-        <p14:creationId xmlns:p14="http://schemas.microsoft.com/office/powerpoint/2010/main" val="560679873"/>
-      </p:ext>
-    </p:extLst>
   </p:cSld>
   <p:clrMapOvr>
     <a:masterClrMapping/>
@@ -1775,6 +2143,136 @@
           </a:bodyPr>
           <a:lstStyle/>
           <a:p>
+            <a:pPr marL="0" marR="0" lvl="0" indent="0" algn="l" defTabSz="914400" rtl="0" eaLnBrk="1" fontAlgn="auto" latinLnBrk="0" hangingPunct="1">
+              <a:lnSpc>
+                <a:spcPct val="100000"/>
+              </a:lnSpc>
+              <a:spcBef>
+                <a:spcPts val="0"/>
+              </a:spcBef>
+              <a:spcAft>
+                <a:spcPts val="0"/>
+              </a:spcAft>
+              <a:buClr>
+                <a:srgbClr val="000000"/>
+              </a:buClr>
+              <a:buSzPts val="1100"/>
+              <a:buFont typeface="Arial"/>
+              <a:buNone/>
+              <a:tabLst/>
+              <a:defRPr/>
+            </a:pPr>
+            <a:r>
+              <a:rPr lang="it-IT" dirty="0"/>
+              <a:t>Per fare ciò abbiamo usato </a:t>
+            </a:r>
+            <a:r>
+              <a:rPr lang="it-IT" dirty="0" err="1"/>
+              <a:t>Kaggle</a:t>
+            </a:r>
+            <a:r>
+              <a:rPr lang="it-IT" dirty="0"/>
+              <a:t>. I dati presenti in questo link sono i seguenti:</a:t>
+            </a:r>
+          </a:p>
+        </p:txBody>
+      </p:sp>
+    </p:spTree>
+    <p:extLst>
+      <p:ext uri="{BB962C8B-B14F-4D97-AF65-F5344CB8AC3E}">
+        <p14:creationId xmlns:p14="http://schemas.microsoft.com/office/powerpoint/2010/main" val="560679873"/>
+      </p:ext>
+    </p:extLst>
+  </p:cSld>
+  <p:clrMapOvr>
+    <a:masterClrMapping/>
+  </p:clrMapOvr>
+</p:notes>
+</file>
+
+<file path=ppt/notesSlides/notesSlide7.xml><?xml version="1.0" encoding="utf-8"?>
+<p:notes xmlns:a="http://schemas.openxmlformats.org/drawingml/2006/main" xmlns:r="http://schemas.openxmlformats.org/officeDocument/2006/relationships" xmlns:p="http://schemas.openxmlformats.org/presentationml/2006/main" showMasterSp="0" showMasterPhAnim="0">
+  <p:cSld>
+    <p:spTree>
+      <p:nvGrpSpPr>
+        <p:cNvPr id="1" name="Shape 1449"/>
+        <p:cNvGrpSpPr/>
+        <p:nvPr/>
+      </p:nvGrpSpPr>
+      <p:grpSpPr>
+        <a:xfrm>
+          <a:off x="0" y="0"/>
+          <a:ext cx="0" cy="0"/>
+          <a:chOff x="0" y="0"/>
+          <a:chExt cx="0" cy="0"/>
+        </a:xfrm>
+      </p:grpSpPr>
+      <p:sp>
+        <p:nvSpPr>
+          <p:cNvPr id="1450" name="Google Shape;1450;g11b20512f71_0_1237:notes"/>
+          <p:cNvSpPr>
+            <a:spLocks noGrp="1" noRot="1" noChangeAspect="1"/>
+          </p:cNvSpPr>
+          <p:nvPr>
+            <p:ph type="sldImg" idx="2"/>
+          </p:nvPr>
+        </p:nvSpPr>
+        <p:spPr>
+          <a:xfrm>
+            <a:off x="381000" y="685800"/>
+            <a:ext cx="6096000" cy="3429000"/>
+          </a:xfrm>
+          <a:custGeom>
+            <a:avLst/>
+            <a:gdLst/>
+            <a:ahLst/>
+            <a:cxnLst/>
+            <a:rect l="l" t="t" r="r" b="b"/>
+            <a:pathLst>
+              <a:path w="120000" h="120000" extrusionOk="0">
+                <a:moveTo>
+                  <a:pt x="0" y="0"/>
+                </a:moveTo>
+                <a:lnTo>
+                  <a:pt x="120000" y="0"/>
+                </a:lnTo>
+                <a:lnTo>
+                  <a:pt x="120000" y="120000"/>
+                </a:lnTo>
+                <a:lnTo>
+                  <a:pt x="0" y="120000"/>
+                </a:lnTo>
+                <a:close/>
+              </a:path>
+            </a:pathLst>
+          </a:custGeom>
+        </p:spPr>
+      </p:sp>
+      <p:sp>
+        <p:nvSpPr>
+          <p:cNvPr id="1451" name="Google Shape;1451;g11b20512f71_0_1237:notes"/>
+          <p:cNvSpPr txBox="1">
+            <a:spLocks noGrp="1"/>
+          </p:cNvSpPr>
+          <p:nvPr>
+            <p:ph type="body" idx="1"/>
+          </p:nvPr>
+        </p:nvSpPr>
+        <p:spPr>
+          <a:xfrm>
+            <a:off x="685800" y="4343400"/>
+            <a:ext cx="5486400" cy="4114800"/>
+          </a:xfrm>
+          <a:prstGeom prst="rect">
+            <a:avLst/>
+          </a:prstGeom>
+        </p:spPr>
+        <p:txBody>
+          <a:bodyPr spcFirstLastPara="1" wrap="square" lIns="91425" tIns="91425" rIns="91425" bIns="91425" anchor="t" anchorCtr="0">
+            <a:noAutofit/>
+          </a:bodyPr>
+          <a:lstStyle/>
+          <a:p>
             <a:pPr marL="0" lvl="0" indent="0" algn="l" rtl="0">
               <a:spcBef>
                 <a:spcPts val="0"/>
@@ -1784,7 +2282,11 @@
               </a:spcAft>
               <a:buNone/>
             </a:pPr>
-            <a:endParaRPr/>
+            <a:r>
+              <a:rPr lang="it-IT" dirty="0"/>
+              <a:t>Lo step successivo è stato quello di selezionare i dati di nostro interesse, andando così a definire il nostro mini word</a:t>
+            </a:r>
+            <a:endParaRPr dirty="0"/>
           </a:p>
         </p:txBody>
       </p:sp>
@@ -1801,7 +2303,7 @@
 </p:notes>
 </file>
 
-<file path=ppt/notesSlides/notesSlide7.xml><?xml version="1.0" encoding="utf-8"?>
+<file path=ppt/notesSlides/notesSlide8.xml><?xml version="1.0" encoding="utf-8"?>
 <p:notes xmlns:a="http://schemas.openxmlformats.org/drawingml/2006/main" xmlns:r="http://schemas.openxmlformats.org/officeDocument/2006/relationships" xmlns:p="http://schemas.openxmlformats.org/presentationml/2006/main" showMasterSp="0" showMasterPhAnim="0">
   <p:cSld>
     <p:spTree>
@@ -1893,120 +2395,15 @@
               </a:spcAft>
               <a:buNone/>
             </a:pPr>
-            <a:endParaRPr/>
+            <a:r>
+              <a:rPr lang="it-IT" dirty="0"/>
+              <a:t>Presentare i concetti e le relazioni che ci sono tra loro. Indicare che Users l’abbiamo aggiunta noi per le operazioni di inserimenti, cancellazione e modifica</a:t>
+            </a:r>
+            <a:endParaRPr dirty="0"/>
           </a:p>
         </p:txBody>
       </p:sp>
     </p:spTree>
-  </p:cSld>
-  <p:clrMapOvr>
-    <a:masterClrMapping/>
-  </p:clrMapOvr>
-</p:notes>
-</file>
-
-<file path=ppt/notesSlides/notesSlide8.xml><?xml version="1.0" encoding="utf-8"?>
-<p:notes xmlns:a="http://schemas.openxmlformats.org/drawingml/2006/main" xmlns:r="http://schemas.openxmlformats.org/officeDocument/2006/relationships" xmlns:p="http://schemas.openxmlformats.org/presentationml/2006/main" showMasterSp="0" showMasterPhAnim="0">
-  <p:cSld>
-    <p:spTree>
-      <p:nvGrpSpPr>
-        <p:cNvPr id="1" name="Shape 1449"/>
-        <p:cNvGrpSpPr/>
-        <p:nvPr/>
-      </p:nvGrpSpPr>
-      <p:grpSpPr>
-        <a:xfrm>
-          <a:off x="0" y="0"/>
-          <a:ext cx="0" cy="0"/>
-          <a:chOff x="0" y="0"/>
-          <a:chExt cx="0" cy="0"/>
-        </a:xfrm>
-      </p:grpSpPr>
-      <p:sp>
-        <p:nvSpPr>
-          <p:cNvPr id="1450" name="Google Shape;1450;g11b20512f71_0_1237:notes"/>
-          <p:cNvSpPr>
-            <a:spLocks noGrp="1" noRot="1" noChangeAspect="1"/>
-          </p:cNvSpPr>
-          <p:nvPr>
-            <p:ph type="sldImg" idx="2"/>
-          </p:nvPr>
-        </p:nvSpPr>
-        <p:spPr>
-          <a:xfrm>
-            <a:off x="381000" y="685800"/>
-            <a:ext cx="6096000" cy="3429000"/>
-          </a:xfrm>
-          <a:custGeom>
-            <a:avLst/>
-            <a:gdLst/>
-            <a:ahLst/>
-            <a:cxnLst/>
-            <a:rect l="l" t="t" r="r" b="b"/>
-            <a:pathLst>
-              <a:path w="120000" h="120000" extrusionOk="0">
-                <a:moveTo>
-                  <a:pt x="0" y="0"/>
-                </a:moveTo>
-                <a:lnTo>
-                  <a:pt x="120000" y="0"/>
-                </a:lnTo>
-                <a:lnTo>
-                  <a:pt x="120000" y="120000"/>
-                </a:lnTo>
-                <a:lnTo>
-                  <a:pt x="0" y="120000"/>
-                </a:lnTo>
-                <a:close/>
-              </a:path>
-            </a:pathLst>
-          </a:custGeom>
-        </p:spPr>
-      </p:sp>
-      <p:sp>
-        <p:nvSpPr>
-          <p:cNvPr id="1451" name="Google Shape;1451;g11b20512f71_0_1237:notes"/>
-          <p:cNvSpPr txBox="1">
-            <a:spLocks noGrp="1"/>
-          </p:cNvSpPr>
-          <p:nvPr>
-            <p:ph type="body" idx="1"/>
-          </p:nvPr>
-        </p:nvSpPr>
-        <p:spPr>
-          <a:xfrm>
-            <a:off x="685800" y="4343400"/>
-            <a:ext cx="5486400" cy="4114800"/>
-          </a:xfrm>
-          <a:prstGeom prst="rect">
-            <a:avLst/>
-          </a:prstGeom>
-        </p:spPr>
-        <p:txBody>
-          <a:bodyPr spcFirstLastPara="1" wrap="square" lIns="91425" tIns="91425" rIns="91425" bIns="91425" anchor="t" anchorCtr="0">
-            <a:noAutofit/>
-          </a:bodyPr>
-          <a:lstStyle/>
-          <a:p>
-            <a:pPr marL="0" lvl="0" indent="0" algn="l" rtl="0">
-              <a:spcBef>
-                <a:spcPts val="0"/>
-              </a:spcBef>
-              <a:spcAft>
-                <a:spcPts val="0"/>
-              </a:spcAft>
-              <a:buNone/>
-            </a:pPr>
-            <a:endParaRPr/>
-          </a:p>
-        </p:txBody>
-      </p:sp>
-    </p:spTree>
-    <p:extLst>
-      <p:ext uri="{BB962C8B-B14F-4D97-AF65-F5344CB8AC3E}">
-        <p14:creationId xmlns:p14="http://schemas.microsoft.com/office/powerpoint/2010/main" val="2181214212"/>
-      </p:ext>
-    </p:extLst>
   </p:cSld>
   <p:clrMapOvr>
     <a:masterClrMapping/>
@@ -2106,14 +2503,50 @@
               </a:spcAft>
               <a:buNone/>
             </a:pPr>
-            <a:endParaRPr/>
+            <a:r>
+              <a:rPr lang="it-IT" dirty="0" err="1"/>
+              <a:t>Dopodichè</a:t>
+            </a:r>
+            <a:r>
+              <a:rPr lang="it-IT" dirty="0"/>
+              <a:t>, dai dati estratti, abbiamo dovuto applicare tecniche di data </a:t>
+            </a:r>
+            <a:r>
+              <a:rPr lang="it-IT" dirty="0" err="1"/>
+              <a:t>cleaning</a:t>
+            </a:r>
+            <a:r>
+              <a:rPr lang="it-IT" dirty="0"/>
+              <a:t> per </a:t>
+            </a:r>
+            <a:r>
+              <a:rPr lang="it-IT" dirty="0" err="1"/>
+              <a:t>usufluire</a:t>
+            </a:r>
+            <a:r>
+              <a:rPr lang="it-IT" dirty="0"/>
+              <a:t> del concetto di </a:t>
+            </a:r>
+            <a:r>
+              <a:rPr lang="it-IT" dirty="0" err="1"/>
+              <a:t>schemeless</a:t>
+            </a:r>
+            <a:r>
+              <a:rPr lang="it-IT" dirty="0"/>
+              <a:t> di </a:t>
+            </a:r>
+            <a:r>
+              <a:rPr lang="it-IT" dirty="0" err="1"/>
+              <a:t>MongoDB</a:t>
+            </a:r>
+            <a:endParaRPr dirty="0"/>
           </a:p>
         </p:txBody>
       </p:sp>
     </p:spTree>
     <p:extLst>
       <p:ext uri="{BB962C8B-B14F-4D97-AF65-F5344CB8AC3E}">
-        <p14:creationId xmlns:p14="http://schemas.microsoft.com/office/powerpoint/2010/main" val="253875652"/>
+        <p14:creationId xmlns:p14="http://schemas.microsoft.com/office/powerpoint/2010/main" val="3804939414"/>
       </p:ext>
     </p:extLst>
   </p:cSld>
@@ -19301,6 +19734,835 @@
           <a:chExt cx="0" cy="0"/>
         </a:xfrm>
       </p:grpSpPr>
+      <p:sp>
+        <p:nvSpPr>
+          <p:cNvPr id="5" name="Titolo 4">
+            <a:extLst>
+              <a:ext uri="{FF2B5EF4-FFF2-40B4-BE49-F238E27FC236}">
+                <a16:creationId xmlns:a16="http://schemas.microsoft.com/office/drawing/2014/main" id="{3F6962DC-6012-9B0A-76E9-7FB830B2761E}"/>
+              </a:ext>
+            </a:extLst>
+          </p:cNvPr>
+          <p:cNvSpPr>
+            <a:spLocks noGrp="1"/>
+          </p:cNvSpPr>
+          <p:nvPr>
+            <p:ph type="title"/>
+          </p:nvPr>
+        </p:nvSpPr>
+        <p:spPr>
+          <a:xfrm>
+            <a:off x="750426" y="891098"/>
+            <a:ext cx="7290915" cy="964200"/>
+          </a:xfrm>
+        </p:spPr>
+        <p:txBody>
+          <a:bodyPr/>
+          <a:lstStyle/>
+          <a:p>
+            <a:r>
+              <a:rPr lang="en-US" sz="2000" dirty="0"/>
+              <a:t>We replaced the ‘\N’ characters with an empty value to apply the </a:t>
+            </a:r>
+            <a:r>
+              <a:rPr lang="en-US" sz="2000" dirty="0" err="1"/>
+              <a:t>mongoDB</a:t>
+            </a:r>
+            <a:r>
+              <a:rPr lang="en-US" sz="2000" dirty="0"/>
+              <a:t> </a:t>
+            </a:r>
+            <a:r>
+              <a:rPr lang="en-US" sz="2000" dirty="0" err="1"/>
+              <a:t>schemaless</a:t>
+            </a:r>
+            <a:r>
+              <a:rPr lang="en-US" sz="2000" dirty="0"/>
+              <a:t> property. </a:t>
+            </a:r>
+            <a:endParaRPr lang="it-IT" sz="2000" dirty="0"/>
+          </a:p>
+        </p:txBody>
+      </p:sp>
+      <p:pic>
+        <p:nvPicPr>
+          <p:cNvPr id="7" name="Immagine 6" descr="Immagine che contiene testo, schermata, Carattere, software&#10;&#10;Descrizione generata automaticamente">
+            <a:extLst>
+              <a:ext uri="{FF2B5EF4-FFF2-40B4-BE49-F238E27FC236}">
+                <a16:creationId xmlns:a16="http://schemas.microsoft.com/office/drawing/2014/main" id="{65BD9C2E-13E3-2959-B6CA-32BB24AF046E}"/>
+              </a:ext>
+            </a:extLst>
+          </p:cNvPr>
+          <p:cNvPicPr>
+            <a:picLocks noChangeAspect="1"/>
+          </p:cNvPicPr>
+          <p:nvPr/>
+        </p:nvPicPr>
+        <p:blipFill>
+          <a:blip r:embed="rId3"/>
+          <a:stretch>
+            <a:fillRect/>
+          </a:stretch>
+        </p:blipFill>
+        <p:spPr>
+          <a:xfrm>
+            <a:off x="1535167" y="2043714"/>
+            <a:ext cx="6073666" cy="2751058"/>
+          </a:xfrm>
+          <a:prstGeom prst="rect">
+            <a:avLst/>
+          </a:prstGeom>
+        </p:spPr>
+      </p:pic>
+    </p:spTree>
+    <p:extLst>
+      <p:ext uri="{BB962C8B-B14F-4D97-AF65-F5344CB8AC3E}">
+        <p14:creationId xmlns:p14="http://schemas.microsoft.com/office/powerpoint/2010/main" val="3104338970"/>
+      </p:ext>
+    </p:extLst>
+  </p:cSld>
+  <p:clrMapOvr>
+    <a:masterClrMapping/>
+  </p:clrMapOvr>
+  <mc:AlternateContent xmlns:mc="http://schemas.openxmlformats.org/markup-compatibility/2006" xmlns:p14="http://schemas.microsoft.com/office/powerpoint/2010/main">
+    <mc:Choice Requires="p14">
+      <p:transition spd="med" p14:dur="700">
+        <p:fade/>
+      </p:transition>
+    </mc:Choice>
+    <mc:Fallback xmlns="">
+      <p:transition spd="med">
+        <p:fade/>
+      </p:transition>
+    </mc:Fallback>
+  </mc:AlternateContent>
+  <p:timing>
+    <p:tnLst>
+      <p:par>
+        <p:cTn id="1" dur="indefinite" restart="never" nodeType="tmRoot">
+          <p:childTnLst>
+            <p:seq concurrent="1" nextAc="seek">
+              <p:cTn id="2" dur="indefinite" nodeType="mainSeq">
+                <p:childTnLst>
+                  <p:par>
+                    <p:cTn id="3" fill="hold">
+                      <p:stCondLst>
+                        <p:cond delay="indefinite"/>
+                        <p:cond evt="onBegin" delay="0">
+                          <p:tn val="2"/>
+                        </p:cond>
+                      </p:stCondLst>
+                      <p:childTnLst>
+                        <p:par>
+                          <p:cTn id="4" fill="hold">
+                            <p:stCondLst>
+                              <p:cond delay="0"/>
+                            </p:stCondLst>
+                            <p:childTnLst>
+                              <p:par>
+                                <p:cTn id="5" presetID="10" presetClass="entr" presetSubtype="0" fill="hold" nodeType="withEffect">
+                                  <p:stCondLst>
+                                    <p:cond delay="0"/>
+                                  </p:stCondLst>
+                                  <p:childTnLst>
+                                    <p:set>
+                                      <p:cBhvr>
+                                        <p:cTn id="6" dur="1" fill="hold">
+                                          <p:stCondLst>
+                                            <p:cond delay="0"/>
+                                          </p:stCondLst>
+                                        </p:cTn>
+                                        <p:tgtEl>
+                                          <p:spTgt spid="7"/>
+                                        </p:tgtEl>
+                                        <p:attrNameLst>
+                                          <p:attrName>style.visibility</p:attrName>
+                                        </p:attrNameLst>
+                                      </p:cBhvr>
+                                      <p:to>
+                                        <p:strVal val="visible"/>
+                                      </p:to>
+                                    </p:set>
+                                    <p:animEffect transition="in" filter="fade">
+                                      <p:cBhvr>
+                                        <p:cTn id="7" dur="500"/>
+                                        <p:tgtEl>
+                                          <p:spTgt spid="7"/>
+                                        </p:tgtEl>
+                                      </p:cBhvr>
+                                    </p:animEffect>
+                                  </p:childTnLst>
+                                </p:cTn>
+                              </p:par>
+                            </p:childTnLst>
+                          </p:cTn>
+                        </p:par>
+                      </p:childTnLst>
+                    </p:cTn>
+                  </p:par>
+                </p:childTnLst>
+              </p:cTn>
+              <p:prevCondLst>
+                <p:cond evt="onPrev" delay="0">
+                  <p:tgtEl>
+                    <p:sldTgt/>
+                  </p:tgtEl>
+                </p:cond>
+              </p:prevCondLst>
+              <p:nextCondLst>
+                <p:cond evt="onNext" delay="0">
+                  <p:tgtEl>
+                    <p:sldTgt/>
+                  </p:tgtEl>
+                </p:cond>
+              </p:nextCondLst>
+            </p:seq>
+          </p:childTnLst>
+        </p:cTn>
+      </p:par>
+    </p:tnLst>
+  </p:timing>
+</p:sld>
+</file>
+
+<file path=ppt/slides/slide11.xml><?xml version="1.0" encoding="utf-8"?>
+<p:sld xmlns:a="http://schemas.openxmlformats.org/drawingml/2006/main" xmlns:r="http://schemas.openxmlformats.org/officeDocument/2006/relationships" xmlns:p="http://schemas.openxmlformats.org/presentationml/2006/main">
+  <p:cSld>
+    <p:spTree>
+      <p:nvGrpSpPr>
+        <p:cNvPr id="1" name="Shape 1452"/>
+        <p:cNvGrpSpPr/>
+        <p:nvPr/>
+      </p:nvGrpSpPr>
+      <p:grpSpPr>
+        <a:xfrm>
+          <a:off x="0" y="0"/>
+          <a:ext cx="0" cy="0"/>
+          <a:chOff x="0" y="0"/>
+          <a:chExt cx="0" cy="0"/>
+        </a:xfrm>
+      </p:grpSpPr>
+      <p:sp>
+        <p:nvSpPr>
+          <p:cNvPr id="1459" name="Google Shape;1459;p36"/>
+          <p:cNvSpPr txBox="1">
+            <a:spLocks noGrp="1"/>
+          </p:cNvSpPr>
+          <p:nvPr>
+            <p:ph type="title"/>
+          </p:nvPr>
+        </p:nvSpPr>
+        <p:spPr>
+          <a:xfrm>
+            <a:off x="2639740" y="1213828"/>
+            <a:ext cx="4827600" cy="964200"/>
+          </a:xfrm>
+          <a:prstGeom prst="rect">
+            <a:avLst/>
+          </a:prstGeom>
+        </p:spPr>
+        <p:txBody>
+          <a:bodyPr spcFirstLastPara="1" wrap="square" lIns="91425" tIns="0" rIns="91425" bIns="0" anchor="ctr" anchorCtr="0">
+            <a:noAutofit/>
+          </a:bodyPr>
+          <a:lstStyle/>
+          <a:p>
+            <a:pPr marL="0" lvl="0" indent="0" algn="l" rtl="0">
+              <a:spcBef>
+                <a:spcPts val="0"/>
+              </a:spcBef>
+              <a:spcAft>
+                <a:spcPts val="0"/>
+              </a:spcAft>
+              <a:buNone/>
+            </a:pPr>
+            <a:r>
+              <a:rPr lang="en"/>
+              <a:t>MongoDB</a:t>
+            </a:r>
+            <a:endParaRPr/>
+          </a:p>
+        </p:txBody>
+      </p:sp>
+      <p:sp>
+        <p:nvSpPr>
+          <p:cNvPr id="1460" name="Google Shape;1460;p36"/>
+          <p:cNvSpPr txBox="1">
+            <a:spLocks noGrp="1"/>
+          </p:cNvSpPr>
+          <p:nvPr>
+            <p:ph type="title" idx="2"/>
+          </p:nvPr>
+        </p:nvSpPr>
+        <p:spPr>
+          <a:xfrm>
+            <a:off x="1273250" y="1241332"/>
+            <a:ext cx="1069525" cy="1035223"/>
+          </a:xfrm>
+          <a:prstGeom prst="rect">
+            <a:avLst/>
+          </a:prstGeom>
+        </p:spPr>
+        <p:txBody>
+          <a:bodyPr spcFirstLastPara="1" wrap="square" lIns="91425" tIns="91425" rIns="91425" bIns="91425" anchor="ctr" anchorCtr="0">
+            <a:noAutofit/>
+          </a:bodyPr>
+          <a:lstStyle/>
+          <a:p>
+            <a:pPr marL="0" lvl="0" indent="0" algn="ctr" rtl="0">
+              <a:spcBef>
+                <a:spcPts val="0"/>
+              </a:spcBef>
+              <a:spcAft>
+                <a:spcPts val="0"/>
+              </a:spcAft>
+              <a:buNone/>
+            </a:pPr>
+            <a:r>
+              <a:rPr lang="en" sz="3500"/>
+              <a:t>03</a:t>
+            </a:r>
+            <a:endParaRPr sz="3500"/>
+          </a:p>
+        </p:txBody>
+      </p:sp>
+      <p:sp>
+        <p:nvSpPr>
+          <p:cNvPr id="8" name="Google Shape;1474;p37">
+            <a:extLst>
+              <a:ext uri="{FF2B5EF4-FFF2-40B4-BE49-F238E27FC236}">
+                <a16:creationId xmlns:a16="http://schemas.microsoft.com/office/drawing/2014/main" id="{D96CA941-1005-1A01-388E-287269220C9B}"/>
+              </a:ext>
+            </a:extLst>
+          </p:cNvPr>
+          <p:cNvSpPr/>
+          <p:nvPr/>
+        </p:nvSpPr>
+        <p:spPr>
+          <a:xfrm flipH="1">
+            <a:off x="995525" y="4698850"/>
+            <a:ext cx="7152900" cy="172500"/>
+          </a:xfrm>
+          <a:prstGeom prst="ellipse">
+            <a:avLst/>
+          </a:prstGeom>
+          <a:solidFill>
+            <a:srgbClr val="1E1E1E">
+              <a:alpha val="7590"/>
+            </a:srgbClr>
+          </a:solidFill>
+          <a:ln>
+            <a:noFill/>
+          </a:ln>
+        </p:spPr>
+        <p:txBody>
+          <a:bodyPr spcFirstLastPara="1" wrap="square" lIns="91425" tIns="91425" rIns="91425" bIns="91425" anchor="ctr" anchorCtr="0">
+            <a:noAutofit/>
+          </a:bodyPr>
+          <a:lstStyle/>
+          <a:p>
+            <a:pPr marL="0" lvl="0" indent="0" algn="l" rtl="0">
+              <a:spcBef>
+                <a:spcPts val="0"/>
+              </a:spcBef>
+              <a:spcAft>
+                <a:spcPts val="0"/>
+              </a:spcAft>
+              <a:buNone/>
+            </a:pPr>
+            <a:endParaRPr/>
+          </a:p>
+        </p:txBody>
+      </p:sp>
+      <p:pic>
+        <p:nvPicPr>
+          <p:cNvPr id="10" name="Immagine 9" descr="Immagine che contiene verde, creatività, arte&#10;&#10;Descrizione generata automaticamente">
+            <a:extLst>
+              <a:ext uri="{FF2B5EF4-FFF2-40B4-BE49-F238E27FC236}">
+                <a16:creationId xmlns:a16="http://schemas.microsoft.com/office/drawing/2014/main" id="{C5FD9A4B-8704-60EF-EE4E-8E3EA7CE5E0C}"/>
+              </a:ext>
+            </a:extLst>
+          </p:cNvPr>
+          <p:cNvPicPr>
+            <a:picLocks noChangeAspect="1"/>
+          </p:cNvPicPr>
+          <p:nvPr/>
+        </p:nvPicPr>
+        <p:blipFill>
+          <a:blip r:embed="rId3"/>
+          <a:stretch>
+            <a:fillRect/>
+          </a:stretch>
+        </p:blipFill>
+        <p:spPr>
+          <a:xfrm>
+            <a:off x="5390430" y="1241332"/>
+            <a:ext cx="668100" cy="668100"/>
+          </a:xfrm>
+          <a:prstGeom prst="rect">
+            <a:avLst/>
+          </a:prstGeom>
+        </p:spPr>
+      </p:pic>
+      <p:grpSp>
+        <p:nvGrpSpPr>
+          <p:cNvPr id="2" name="Google Shape;1920;p57">
+            <a:extLst>
+              <a:ext uri="{FF2B5EF4-FFF2-40B4-BE49-F238E27FC236}">
+                <a16:creationId xmlns:a16="http://schemas.microsoft.com/office/drawing/2014/main" id="{D44D42C0-0654-8EBA-2555-F678458E2205}"/>
+              </a:ext>
+            </a:extLst>
+          </p:cNvPr>
+          <p:cNvGrpSpPr/>
+          <p:nvPr/>
+        </p:nvGrpSpPr>
+        <p:grpSpPr>
+          <a:xfrm>
+            <a:off x="1121475" y="3843025"/>
+            <a:ext cx="1221300" cy="570400"/>
+            <a:chOff x="670175" y="3809850"/>
+            <a:chExt cx="1221300" cy="570400"/>
+          </a:xfrm>
+        </p:grpSpPr>
+        <p:cxnSp>
+          <p:nvCxnSpPr>
+            <p:cNvPr id="11" name="Google Shape;1921;p57">
+              <a:extLst>
+                <a:ext uri="{FF2B5EF4-FFF2-40B4-BE49-F238E27FC236}">
+                  <a16:creationId xmlns:a16="http://schemas.microsoft.com/office/drawing/2014/main" id="{61F3F36F-D7AF-3D72-0A51-E4890D75B04B}"/>
+                </a:ext>
+              </a:extLst>
+            </p:cNvPr>
+            <p:cNvCxnSpPr/>
+            <p:nvPr/>
+          </p:nvCxnSpPr>
+          <p:spPr>
+            <a:xfrm rot="10800000">
+              <a:off x="670175" y="3999983"/>
+              <a:ext cx="1221300" cy="0"/>
+            </a:xfrm>
+            <a:prstGeom prst="straightConnector1">
+              <a:avLst/>
+            </a:prstGeom>
+            <a:noFill/>
+            <a:ln w="9525" cap="flat" cmpd="sng">
+              <a:solidFill>
+                <a:schemeClr val="dk2"/>
+              </a:solidFill>
+              <a:prstDash val="solid"/>
+              <a:round/>
+              <a:headEnd type="none" w="med" len="med"/>
+              <a:tailEnd type="none" w="med" len="med"/>
+            </a:ln>
+          </p:spPr>
+        </p:cxnSp>
+        <p:cxnSp>
+          <p:nvCxnSpPr>
+            <p:cNvPr id="12" name="Google Shape;1922;p57">
+              <a:extLst>
+                <a:ext uri="{FF2B5EF4-FFF2-40B4-BE49-F238E27FC236}">
+                  <a16:creationId xmlns:a16="http://schemas.microsoft.com/office/drawing/2014/main" id="{F5FD9E87-D90C-2DD4-589B-6C235BF5A06E}"/>
+                </a:ext>
+              </a:extLst>
+            </p:cNvPr>
+            <p:cNvCxnSpPr/>
+            <p:nvPr/>
+          </p:nvCxnSpPr>
+          <p:spPr>
+            <a:xfrm rot="10800000">
+              <a:off x="670175" y="4380250"/>
+              <a:ext cx="1221300" cy="0"/>
+            </a:xfrm>
+            <a:prstGeom prst="straightConnector1">
+              <a:avLst/>
+            </a:prstGeom>
+            <a:noFill/>
+            <a:ln w="9525" cap="flat" cmpd="sng">
+              <a:solidFill>
+                <a:schemeClr val="dk2"/>
+              </a:solidFill>
+              <a:prstDash val="solid"/>
+              <a:round/>
+              <a:headEnd type="none" w="med" len="med"/>
+              <a:tailEnd type="none" w="med" len="med"/>
+            </a:ln>
+          </p:spPr>
+        </p:cxnSp>
+        <p:cxnSp>
+          <p:nvCxnSpPr>
+            <p:cNvPr id="13" name="Google Shape;1923;p57">
+              <a:extLst>
+                <a:ext uri="{FF2B5EF4-FFF2-40B4-BE49-F238E27FC236}">
+                  <a16:creationId xmlns:a16="http://schemas.microsoft.com/office/drawing/2014/main" id="{A341A0E5-88B7-40C6-71F4-F287B6DACFA1}"/>
+                </a:ext>
+              </a:extLst>
+            </p:cNvPr>
+            <p:cNvCxnSpPr/>
+            <p:nvPr/>
+          </p:nvCxnSpPr>
+          <p:spPr>
+            <a:xfrm rot="10800000">
+              <a:off x="995525" y="4190117"/>
+              <a:ext cx="570600" cy="0"/>
+            </a:xfrm>
+            <a:prstGeom prst="straightConnector1">
+              <a:avLst/>
+            </a:prstGeom>
+            <a:noFill/>
+            <a:ln w="9525" cap="flat" cmpd="sng">
+              <a:solidFill>
+                <a:schemeClr val="dk2"/>
+              </a:solidFill>
+              <a:prstDash val="solid"/>
+              <a:round/>
+              <a:headEnd type="none" w="med" len="med"/>
+              <a:tailEnd type="none" w="med" len="med"/>
+            </a:ln>
+          </p:spPr>
+        </p:cxnSp>
+        <p:cxnSp>
+          <p:nvCxnSpPr>
+            <p:cNvPr id="14" name="Google Shape;1924;p57">
+              <a:extLst>
+                <a:ext uri="{FF2B5EF4-FFF2-40B4-BE49-F238E27FC236}">
+                  <a16:creationId xmlns:a16="http://schemas.microsoft.com/office/drawing/2014/main" id="{6C790D01-5FC3-BFFF-D0CA-1CE3C420D74C}"/>
+                </a:ext>
+              </a:extLst>
+            </p:cNvPr>
+            <p:cNvCxnSpPr/>
+            <p:nvPr/>
+          </p:nvCxnSpPr>
+          <p:spPr>
+            <a:xfrm rot="10800000">
+              <a:off x="995525" y="3809850"/>
+              <a:ext cx="570600" cy="0"/>
+            </a:xfrm>
+            <a:prstGeom prst="straightConnector1">
+              <a:avLst/>
+            </a:prstGeom>
+            <a:noFill/>
+            <a:ln w="9525" cap="flat" cmpd="sng">
+              <a:solidFill>
+                <a:schemeClr val="dk2"/>
+              </a:solidFill>
+              <a:prstDash val="solid"/>
+              <a:round/>
+              <a:headEnd type="none" w="med" len="med"/>
+              <a:tailEnd type="none" w="med" len="med"/>
+            </a:ln>
+          </p:spPr>
+        </p:cxnSp>
+      </p:grpSp>
+      <p:pic>
+        <p:nvPicPr>
+          <p:cNvPr id="9" name="Google Shape;1475;p37">
+            <a:extLst>
+              <a:ext uri="{FF2B5EF4-FFF2-40B4-BE49-F238E27FC236}">
+                <a16:creationId xmlns:a16="http://schemas.microsoft.com/office/drawing/2014/main" id="{3FC8542E-0F60-A41E-E025-174A12F7A036}"/>
+              </a:ext>
+            </a:extLst>
+          </p:cNvPr>
+          <p:cNvPicPr preferRelativeResize="0"/>
+          <p:nvPr/>
+        </p:nvPicPr>
+        <p:blipFill rotWithShape="1">
+          <a:blip r:embed="rId4">
+            <a:alphaModFix/>
+          </a:blip>
+          <a:srcRect l="3157" b="22039"/>
+          <a:stretch/>
+        </p:blipFill>
+        <p:spPr>
+          <a:xfrm>
+            <a:off x="2267563" y="3721675"/>
+            <a:ext cx="4608825" cy="1107475"/>
+          </a:xfrm>
+          <a:prstGeom prst="rect">
+            <a:avLst/>
+          </a:prstGeom>
+          <a:noFill/>
+          <a:ln>
+            <a:noFill/>
+          </a:ln>
+        </p:spPr>
+      </p:pic>
+    </p:spTree>
+    <p:extLst>
+      <p:ext uri="{BB962C8B-B14F-4D97-AF65-F5344CB8AC3E}">
+        <p14:creationId xmlns:p14="http://schemas.microsoft.com/office/powerpoint/2010/main" val="636184350"/>
+      </p:ext>
+    </p:extLst>
+  </p:cSld>
+  <p:clrMapOvr>
+    <a:masterClrMapping/>
+  </p:clrMapOvr>
+  <mc:AlternateContent xmlns:mc="http://schemas.openxmlformats.org/markup-compatibility/2006" xmlns:p14="http://schemas.microsoft.com/office/powerpoint/2010/main">
+    <mc:Choice Requires="p14">
+      <p:transition spd="med" p14:dur="700">
+        <p:fade/>
+      </p:transition>
+    </mc:Choice>
+    <mc:Fallback xmlns="">
+      <p:transition spd="med">
+        <p:fade/>
+      </p:transition>
+    </mc:Fallback>
+  </mc:AlternateContent>
+  <p:timing>
+    <p:tnLst>
+      <p:par>
+        <p:cTn id="1" dur="indefinite" restart="never" nodeType="tmRoot">
+          <p:childTnLst>
+            <p:seq concurrent="1" nextAc="seek">
+              <p:cTn id="2" dur="indefinite" nodeType="mainSeq">
+                <p:childTnLst>
+                  <p:par>
+                    <p:cTn id="3" fill="hold">
+                      <p:stCondLst>
+                        <p:cond delay="indefinite"/>
+                        <p:cond evt="onBegin" delay="0">
+                          <p:tn val="2"/>
+                        </p:cond>
+                      </p:stCondLst>
+                      <p:childTnLst>
+                        <p:par>
+                          <p:cTn id="4" fill="hold">
+                            <p:stCondLst>
+                              <p:cond delay="0"/>
+                            </p:stCondLst>
+                            <p:childTnLst>
+                              <p:par>
+                                <p:cTn id="5" presetID="16" presetClass="entr" presetSubtype="21" fill="hold" grpId="0" nodeType="withEffect">
+                                  <p:stCondLst>
+                                    <p:cond delay="0"/>
+                                  </p:stCondLst>
+                                  <p:childTnLst>
+                                    <p:set>
+                                      <p:cBhvr>
+                                        <p:cTn id="6" dur="1" fill="hold">
+                                          <p:stCondLst>
+                                            <p:cond delay="0"/>
+                                          </p:stCondLst>
+                                        </p:cTn>
+                                        <p:tgtEl>
+                                          <p:spTgt spid="1460"/>
+                                        </p:tgtEl>
+                                        <p:attrNameLst>
+                                          <p:attrName>style.visibility</p:attrName>
+                                        </p:attrNameLst>
+                                      </p:cBhvr>
+                                      <p:to>
+                                        <p:strVal val="visible"/>
+                                      </p:to>
+                                    </p:set>
+                                    <p:animEffect transition="in" filter="barn(inVertical)">
+                                      <p:cBhvr>
+                                        <p:cTn id="7" dur="500"/>
+                                        <p:tgtEl>
+                                          <p:spTgt spid="1460"/>
+                                        </p:tgtEl>
+                                      </p:cBhvr>
+                                    </p:animEffect>
+                                  </p:childTnLst>
+                                </p:cTn>
+                              </p:par>
+                              <p:par>
+                                <p:cTn id="8" presetID="2" presetClass="entr" presetSubtype="8" fill="hold" nodeType="withEffect">
+                                  <p:stCondLst>
+                                    <p:cond delay="0"/>
+                                  </p:stCondLst>
+                                  <p:childTnLst>
+                                    <p:set>
+                                      <p:cBhvr>
+                                        <p:cTn id="9" dur="1" fill="hold">
+                                          <p:stCondLst>
+                                            <p:cond delay="0"/>
+                                          </p:stCondLst>
+                                        </p:cTn>
+                                        <p:tgtEl>
+                                          <p:spTgt spid="9"/>
+                                        </p:tgtEl>
+                                        <p:attrNameLst>
+                                          <p:attrName>style.visibility</p:attrName>
+                                        </p:attrNameLst>
+                                      </p:cBhvr>
+                                      <p:to>
+                                        <p:strVal val="visible"/>
+                                      </p:to>
+                                    </p:set>
+                                    <p:anim calcmode="lin" valueType="num">
+                                      <p:cBhvr additive="base">
+                                        <p:cTn id="10" dur="500" fill="hold"/>
+                                        <p:tgtEl>
+                                          <p:spTgt spid="9"/>
+                                        </p:tgtEl>
+                                        <p:attrNameLst>
+                                          <p:attrName>ppt_x</p:attrName>
+                                        </p:attrNameLst>
+                                      </p:cBhvr>
+                                      <p:tavLst>
+                                        <p:tav tm="0">
+                                          <p:val>
+                                            <p:strVal val="0-#ppt_w/2"/>
+                                          </p:val>
+                                        </p:tav>
+                                        <p:tav tm="100000">
+                                          <p:val>
+                                            <p:strVal val="#ppt_x"/>
+                                          </p:val>
+                                        </p:tav>
+                                      </p:tavLst>
+                                    </p:anim>
+                                    <p:anim calcmode="lin" valueType="num">
+                                      <p:cBhvr additive="base">
+                                        <p:cTn id="11" dur="500" fill="hold"/>
+                                        <p:tgtEl>
+                                          <p:spTgt spid="9"/>
+                                        </p:tgtEl>
+                                        <p:attrNameLst>
+                                          <p:attrName>ppt_y</p:attrName>
+                                        </p:attrNameLst>
+                                      </p:cBhvr>
+                                      <p:tavLst>
+                                        <p:tav tm="0">
+                                          <p:val>
+                                            <p:strVal val="#ppt_y"/>
+                                          </p:val>
+                                        </p:tav>
+                                        <p:tav tm="100000">
+                                          <p:val>
+                                            <p:strVal val="#ppt_y"/>
+                                          </p:val>
+                                        </p:tav>
+                                      </p:tavLst>
+                                    </p:anim>
+                                  </p:childTnLst>
+                                </p:cTn>
+                              </p:par>
+                              <p:par>
+                                <p:cTn id="12" presetID="2" presetClass="entr" presetSubtype="8" fill="hold" nodeType="withEffect">
+                                  <p:stCondLst>
+                                    <p:cond delay="0"/>
+                                  </p:stCondLst>
+                                  <p:childTnLst>
+                                    <p:set>
+                                      <p:cBhvr>
+                                        <p:cTn id="13" dur="1" fill="hold">
+                                          <p:stCondLst>
+                                            <p:cond delay="0"/>
+                                          </p:stCondLst>
+                                        </p:cTn>
+                                        <p:tgtEl>
+                                          <p:spTgt spid="2"/>
+                                        </p:tgtEl>
+                                        <p:attrNameLst>
+                                          <p:attrName>style.visibility</p:attrName>
+                                        </p:attrNameLst>
+                                      </p:cBhvr>
+                                      <p:to>
+                                        <p:strVal val="visible"/>
+                                      </p:to>
+                                    </p:set>
+                                    <p:anim calcmode="lin" valueType="num">
+                                      <p:cBhvr additive="base">
+                                        <p:cTn id="14" dur="500" fill="hold"/>
+                                        <p:tgtEl>
+                                          <p:spTgt spid="2"/>
+                                        </p:tgtEl>
+                                        <p:attrNameLst>
+                                          <p:attrName>ppt_x</p:attrName>
+                                        </p:attrNameLst>
+                                      </p:cBhvr>
+                                      <p:tavLst>
+                                        <p:tav tm="0">
+                                          <p:val>
+                                            <p:strVal val="0-#ppt_w/2"/>
+                                          </p:val>
+                                        </p:tav>
+                                        <p:tav tm="100000">
+                                          <p:val>
+                                            <p:strVal val="#ppt_x"/>
+                                          </p:val>
+                                        </p:tav>
+                                      </p:tavLst>
+                                    </p:anim>
+                                    <p:anim calcmode="lin" valueType="num">
+                                      <p:cBhvr additive="base">
+                                        <p:cTn id="15" dur="500" fill="hold"/>
+                                        <p:tgtEl>
+                                          <p:spTgt spid="2"/>
+                                        </p:tgtEl>
+                                        <p:attrNameLst>
+                                          <p:attrName>ppt_y</p:attrName>
+                                        </p:attrNameLst>
+                                      </p:cBhvr>
+                                      <p:tavLst>
+                                        <p:tav tm="0">
+                                          <p:val>
+                                            <p:strVal val="#ppt_y"/>
+                                          </p:val>
+                                        </p:tav>
+                                        <p:tav tm="100000">
+                                          <p:val>
+                                            <p:strVal val="#ppt_y"/>
+                                          </p:val>
+                                        </p:tav>
+                                      </p:tavLst>
+                                    </p:anim>
+                                  </p:childTnLst>
+                                </p:cTn>
+                              </p:par>
+                            </p:childTnLst>
+                          </p:cTn>
+                        </p:par>
+                      </p:childTnLst>
+                    </p:cTn>
+                  </p:par>
+                </p:childTnLst>
+              </p:cTn>
+              <p:prevCondLst>
+                <p:cond evt="onPrev" delay="0">
+                  <p:tgtEl>
+                    <p:sldTgt/>
+                  </p:tgtEl>
+                </p:cond>
+              </p:prevCondLst>
+              <p:nextCondLst>
+                <p:cond evt="onNext" delay="0">
+                  <p:tgtEl>
+                    <p:sldTgt/>
+                  </p:tgtEl>
+                </p:cond>
+              </p:nextCondLst>
+            </p:seq>
+          </p:childTnLst>
+        </p:cTn>
+      </p:par>
+    </p:tnLst>
+    <p:bldLst>
+      <p:bldP spid="1460" grpId="0" animBg="1"/>
+    </p:bldLst>
+  </p:timing>
+</p:sld>
+</file>
+
+<file path=ppt/slides/slide12.xml><?xml version="1.0" encoding="utf-8"?>
+<p:sld xmlns:a="http://schemas.openxmlformats.org/drawingml/2006/main" xmlns:r="http://schemas.openxmlformats.org/officeDocument/2006/relationships" xmlns:p="http://schemas.openxmlformats.org/presentationml/2006/main">
+  <p:cSld>
+    <p:spTree>
+      <p:nvGrpSpPr>
+        <p:cNvPr id="1" name="Shape 1452"/>
+        <p:cNvGrpSpPr/>
+        <p:nvPr/>
+      </p:nvGrpSpPr>
+      <p:grpSpPr>
+        <a:xfrm>
+          <a:off x="0" y="0"/>
+          <a:ext cx="0" cy="0"/>
+          <a:chOff x="0" y="0"/>
+          <a:chExt cx="0" cy="0"/>
+        </a:xfrm>
+      </p:grpSpPr>
       <p:pic>
         <p:nvPicPr>
           <p:cNvPr id="7" name="Immagine 6" descr="Immagine che contiene testo, schermata, numero, software&#10;&#10;Descrizione generata automaticamente">
@@ -19442,7 +20704,7 @@
 </p:sld>
 </file>
 
-<file path=ppt/slides/slide11.xml><?xml version="1.0" encoding="utf-8"?>
+<file path=ppt/slides/slide13.xml><?xml version="1.0" encoding="utf-8"?>
 <p:sld xmlns:a="http://schemas.openxmlformats.org/drawingml/2006/main" xmlns:r="http://schemas.openxmlformats.org/officeDocument/2006/relationships" xmlns:p="http://schemas.openxmlformats.org/presentationml/2006/main">
   <p:cSld>
     <p:spTree>
@@ -19942,7 +21204,7 @@
 </p:sld>
 </file>
 
-<file path=ppt/slides/slide12.xml><?xml version="1.0" encoding="utf-8"?>
+<file path=ppt/slides/slide14.xml><?xml version="1.0" encoding="utf-8"?>
 <p:sld xmlns:a="http://schemas.openxmlformats.org/drawingml/2006/main" xmlns:r="http://schemas.openxmlformats.org/officeDocument/2006/relationships" xmlns:p="http://schemas.openxmlformats.org/presentationml/2006/main">
   <p:cSld>
     <p:spTree>
@@ -20703,7 +21965,7 @@
 </p:sld>
 </file>
 
-<file path=ppt/slides/slide13.xml><?xml version="1.0" encoding="utf-8"?>
+<file path=ppt/slides/slide15.xml><?xml version="1.0" encoding="utf-8"?>
 <p:sld xmlns:a="http://schemas.openxmlformats.org/drawingml/2006/main" xmlns:r="http://schemas.openxmlformats.org/officeDocument/2006/relationships" xmlns:p="http://schemas.openxmlformats.org/presentationml/2006/main">
   <p:cSld>
     <p:bg>
@@ -21031,6 +22293,232 @@
 </file>
 
 <file path=ppt/slides/slide3.xml><?xml version="1.0" encoding="utf-8"?>
+<p:sld xmlns:a="http://schemas.openxmlformats.org/drawingml/2006/main" xmlns:r="http://schemas.openxmlformats.org/officeDocument/2006/relationships" xmlns:p="http://schemas.openxmlformats.org/presentationml/2006/main">
+  <p:cSld>
+    <p:spTree>
+      <p:nvGrpSpPr>
+        <p:cNvPr id="1" name="Shape 1452"/>
+        <p:cNvGrpSpPr/>
+        <p:nvPr/>
+      </p:nvGrpSpPr>
+      <p:grpSpPr>
+        <a:xfrm>
+          <a:off x="0" y="0"/>
+          <a:ext cx="0" cy="0"/>
+          <a:chOff x="0" y="0"/>
+          <a:chExt cx="0" cy="0"/>
+        </a:xfrm>
+      </p:grpSpPr>
+      <p:sp>
+        <p:nvSpPr>
+          <p:cNvPr id="4" name="Titolo 4">
+            <a:extLst>
+              <a:ext uri="{FF2B5EF4-FFF2-40B4-BE49-F238E27FC236}">
+                <a16:creationId xmlns:a16="http://schemas.microsoft.com/office/drawing/2014/main" id="{005691D9-17D3-3FB0-ED2F-C2FD20D2CE28}"/>
+              </a:ext>
+            </a:extLst>
+          </p:cNvPr>
+          <p:cNvSpPr>
+            <a:spLocks noGrp="1"/>
+          </p:cNvSpPr>
+          <p:nvPr>
+            <p:ph type="title"/>
+          </p:nvPr>
+        </p:nvSpPr>
+        <p:spPr>
+          <a:xfrm>
+            <a:off x="515103" y="467512"/>
+            <a:ext cx="7290915" cy="964200"/>
+          </a:xfrm>
+        </p:spPr>
+        <p:txBody>
+          <a:bodyPr/>
+          <a:lstStyle/>
+          <a:p>
+            <a:r>
+              <a:rPr lang="en-US" sz="3000">
+                <a:latin typeface="Krona One" panose="020B0604020202020204" charset="0"/>
+              </a:rPr>
+              <a:t>Project management</a:t>
+            </a:r>
+            <a:endParaRPr lang="it-IT" sz="3000">
+              <a:latin typeface="Krona One" panose="020B0604020202020204" charset="0"/>
+            </a:endParaRPr>
+          </a:p>
+        </p:txBody>
+      </p:sp>
+      <p:pic>
+        <p:nvPicPr>
+          <p:cNvPr id="5" name="Immagine 4">
+            <a:extLst>
+              <a:ext uri="{FF2B5EF4-FFF2-40B4-BE49-F238E27FC236}">
+                <a16:creationId xmlns:a16="http://schemas.microsoft.com/office/drawing/2014/main" id="{D5F301BC-625C-ED26-C18B-36FEA7306E27}"/>
+              </a:ext>
+            </a:extLst>
+          </p:cNvPr>
+          <p:cNvPicPr>
+            <a:picLocks noChangeAspect="1"/>
+          </p:cNvPicPr>
+          <p:nvPr/>
+        </p:nvPicPr>
+        <p:blipFill>
+          <a:blip r:embed="rId3"/>
+          <a:stretch>
+            <a:fillRect/>
+          </a:stretch>
+        </p:blipFill>
+        <p:spPr>
+          <a:xfrm>
+            <a:off x="1063978" y="1402345"/>
+            <a:ext cx="7016044" cy="3271526"/>
+          </a:xfrm>
+          <a:prstGeom prst="rect">
+            <a:avLst/>
+          </a:prstGeom>
+        </p:spPr>
+      </p:pic>
+      <p:pic>
+        <p:nvPicPr>
+          <p:cNvPr id="8" name="Immagine 7" descr="Immagine che contiene nero, oscurità&#10;&#10;Descrizione generata automaticamente">
+            <a:extLst>
+              <a:ext uri="{FF2B5EF4-FFF2-40B4-BE49-F238E27FC236}">
+                <a16:creationId xmlns:a16="http://schemas.microsoft.com/office/drawing/2014/main" id="{80CEC948-DACF-DF50-58EC-718933B59988}"/>
+              </a:ext>
+            </a:extLst>
+          </p:cNvPr>
+          <p:cNvPicPr>
+            <a:picLocks noChangeAspect="1"/>
+          </p:cNvPicPr>
+          <p:nvPr/>
+        </p:nvPicPr>
+        <p:blipFill>
+          <a:blip r:embed="rId4"/>
+          <a:stretch>
+            <a:fillRect/>
+          </a:stretch>
+        </p:blipFill>
+        <p:spPr>
+          <a:xfrm>
+            <a:off x="8123319" y="4570460"/>
+            <a:ext cx="505578" cy="505578"/>
+          </a:xfrm>
+          <a:prstGeom prst="rect">
+            <a:avLst/>
+          </a:prstGeom>
+        </p:spPr>
+      </p:pic>
+    </p:spTree>
+    <p:extLst>
+      <p:ext uri="{BB962C8B-B14F-4D97-AF65-F5344CB8AC3E}">
+        <p14:creationId xmlns:p14="http://schemas.microsoft.com/office/powerpoint/2010/main" val="3430894505"/>
+      </p:ext>
+    </p:extLst>
+  </p:cSld>
+  <p:clrMapOvr>
+    <a:masterClrMapping/>
+  </p:clrMapOvr>
+  <mc:AlternateContent xmlns:mc="http://schemas.openxmlformats.org/markup-compatibility/2006">
+    <mc:Choice xmlns:p14="http://schemas.microsoft.com/office/powerpoint/2010/main" Requires="p14">
+      <p:transition spd="med" p14:dur="700">
+        <p:fade/>
+      </p:transition>
+    </mc:Choice>
+    <mc:Fallback>
+      <p:transition spd="med">
+        <p:fade/>
+      </p:transition>
+    </mc:Fallback>
+  </mc:AlternateContent>
+  <p:timing>
+    <p:tnLst>
+      <p:par>
+        <p:cTn id="1" dur="indefinite" restart="never" nodeType="tmRoot">
+          <p:childTnLst>
+            <p:seq concurrent="1" nextAc="seek">
+              <p:cTn id="2" dur="indefinite" nodeType="mainSeq">
+                <p:childTnLst>
+                  <p:par>
+                    <p:cTn id="3" fill="hold">
+                      <p:stCondLst>
+                        <p:cond delay="indefinite"/>
+                        <p:cond evt="onBegin" delay="0">
+                          <p:tn val="2"/>
+                        </p:cond>
+                      </p:stCondLst>
+                      <p:childTnLst>
+                        <p:par>
+                          <p:cTn id="4" fill="hold">
+                            <p:stCondLst>
+                              <p:cond delay="0"/>
+                            </p:stCondLst>
+                            <p:childTnLst>
+                              <p:par>
+                                <p:cTn id="5" presetID="10" presetClass="entr" presetSubtype="0" fill="hold" nodeType="withEffect">
+                                  <p:stCondLst>
+                                    <p:cond delay="0"/>
+                                  </p:stCondLst>
+                                  <p:childTnLst>
+                                    <p:set>
+                                      <p:cBhvr>
+                                        <p:cTn id="6" dur="1" fill="hold">
+                                          <p:stCondLst>
+                                            <p:cond delay="0"/>
+                                          </p:stCondLst>
+                                        </p:cTn>
+                                        <p:tgtEl>
+                                          <p:spTgt spid="5"/>
+                                        </p:tgtEl>
+                                        <p:attrNameLst>
+                                          <p:attrName>style.visibility</p:attrName>
+                                        </p:attrNameLst>
+                                      </p:cBhvr>
+                                      <p:to>
+                                        <p:strVal val="visible"/>
+                                      </p:to>
+                                    </p:set>
+                                    <p:animEffect transition="in" filter="fade">
+                                      <p:cBhvr>
+                                        <p:cTn id="7" dur="500"/>
+                                        <p:tgtEl>
+                                          <p:spTgt spid="5"/>
+                                        </p:tgtEl>
+                                      </p:cBhvr>
+                                    </p:animEffect>
+                                  </p:childTnLst>
+                                </p:cTn>
+                              </p:par>
+                            </p:childTnLst>
+                          </p:cTn>
+                        </p:par>
+                      </p:childTnLst>
+                    </p:cTn>
+                  </p:par>
+                </p:childTnLst>
+              </p:cTn>
+              <p:prevCondLst>
+                <p:cond evt="onPrev" delay="0">
+                  <p:tgtEl>
+                    <p:sldTgt/>
+                  </p:tgtEl>
+                </p:cond>
+              </p:prevCondLst>
+              <p:nextCondLst>
+                <p:cond evt="onNext" delay="0">
+                  <p:tgtEl>
+                    <p:sldTgt/>
+                  </p:tgtEl>
+                </p:cond>
+              </p:nextCondLst>
+            </p:seq>
+          </p:childTnLst>
+        </p:cTn>
+      </p:par>
+    </p:tnLst>
+  </p:timing>
+</p:sld>
+</file>
+
+<file path=ppt/slides/slide4.xml><?xml version="1.0" encoding="utf-8"?>
 <p:sld xmlns:a="http://schemas.openxmlformats.org/drawingml/2006/main" xmlns:r="http://schemas.openxmlformats.org/officeDocument/2006/relationships" xmlns:p="http://schemas.openxmlformats.org/presentationml/2006/main">
   <p:cSld>
     <p:spTree>
@@ -23317,7 +24805,7 @@
 </p:sld>
 </file>
 
-<file path=ppt/slides/slide4.xml><?xml version="1.0" encoding="utf-8"?>
+<file path=ppt/slides/slide5.xml><?xml version="1.0" encoding="utf-8"?>
 <p:sld xmlns:a="http://schemas.openxmlformats.org/drawingml/2006/main" xmlns:r="http://schemas.openxmlformats.org/officeDocument/2006/relationships" xmlns:p="http://schemas.openxmlformats.org/presentationml/2006/main">
   <p:cSld>
     <p:spTree>
@@ -23891,7 +25379,7 @@
 </p:sld>
 </file>
 
-<file path=ppt/slides/slide5.xml><?xml version="1.0" encoding="utf-8"?>
+<file path=ppt/slides/slide6.xml><?xml version="1.0" encoding="utf-8"?>
 <p:sld xmlns:a="http://schemas.openxmlformats.org/drawingml/2006/main" xmlns:r="http://schemas.openxmlformats.org/officeDocument/2006/relationships" xmlns:p="http://schemas.openxmlformats.org/presentationml/2006/main">
   <p:cSld>
     <p:spTree>
@@ -24049,7 +25537,7 @@
 </p:sld>
 </file>
 
-<file path=ppt/slides/slide6.xml><?xml version="1.0" encoding="utf-8"?>
+<file path=ppt/slides/slide7.xml><?xml version="1.0" encoding="utf-8"?>
 <p:sld xmlns:a="http://schemas.openxmlformats.org/drawingml/2006/main" xmlns:r="http://schemas.openxmlformats.org/officeDocument/2006/relationships" xmlns:p="http://schemas.openxmlformats.org/presentationml/2006/main">
   <p:cSld>
     <p:spTree>
@@ -24220,10 +25708,17 @@
               <a:buNone/>
             </a:pPr>
             <a:r>
-              <a:rPr lang="en"/>
+              <a:rPr lang="en" dirty="0"/>
               <a:t>Preprocessing</a:t>
             </a:r>
-            <a:endParaRPr/>
+            <a:br>
+              <a:rPr lang="en" dirty="0"/>
+            </a:br>
+            <a:r>
+              <a:rPr lang="en" sz="1400" dirty="0"/>
+              <a:t>Data extraction &amp; Data modelling</a:t>
+            </a:r>
+            <a:endParaRPr sz="1400" dirty="0"/>
           </a:p>
         </p:txBody>
       </p:sp>
@@ -24634,7 +26129,7 @@
 </p:sld>
 </file>
 
-<file path=ppt/slides/slide7.xml><?xml version="1.0" encoding="utf-8"?>
+<file path=ppt/slides/slide8.xml><?xml version="1.0" encoding="utf-8"?>
 <p:sld xmlns:a="http://schemas.openxmlformats.org/drawingml/2006/main" xmlns:r="http://schemas.openxmlformats.org/officeDocument/2006/relationships" xmlns:p="http://schemas.openxmlformats.org/presentationml/2006/main">
   <p:cSld>
     <p:spTree>
@@ -27217,214 +28712,6 @@
 </p:sld>
 </file>
 
-<file path=ppt/slides/slide8.xml><?xml version="1.0" encoding="utf-8"?>
-<p:sld xmlns:a="http://schemas.openxmlformats.org/drawingml/2006/main" xmlns:r="http://schemas.openxmlformats.org/officeDocument/2006/relationships" xmlns:p="http://schemas.openxmlformats.org/presentationml/2006/main">
-  <p:cSld>
-    <p:spTree>
-      <p:nvGrpSpPr>
-        <p:cNvPr id="1" name="Shape 1452"/>
-        <p:cNvGrpSpPr/>
-        <p:nvPr/>
-      </p:nvGrpSpPr>
-      <p:grpSpPr>
-        <a:xfrm>
-          <a:off x="0" y="0"/>
-          <a:ext cx="0" cy="0"/>
-          <a:chOff x="0" y="0"/>
-          <a:chExt cx="0" cy="0"/>
-        </a:xfrm>
-      </p:grpSpPr>
-      <p:sp>
-        <p:nvSpPr>
-          <p:cNvPr id="5" name="Titolo 4">
-            <a:extLst>
-              <a:ext uri="{FF2B5EF4-FFF2-40B4-BE49-F238E27FC236}">
-                <a16:creationId xmlns:a16="http://schemas.microsoft.com/office/drawing/2014/main" id="{3F6962DC-6012-9B0A-76E9-7FB830B2761E}"/>
-              </a:ext>
-            </a:extLst>
-          </p:cNvPr>
-          <p:cNvSpPr>
-            <a:spLocks noGrp="1"/>
-          </p:cNvSpPr>
-          <p:nvPr>
-            <p:ph type="title"/>
-          </p:nvPr>
-        </p:nvSpPr>
-        <p:spPr>
-          <a:xfrm>
-            <a:off x="750426" y="891098"/>
-            <a:ext cx="7290915" cy="964200"/>
-          </a:xfrm>
-        </p:spPr>
-        <p:txBody>
-          <a:bodyPr/>
-          <a:lstStyle/>
-          <a:p>
-            <a:r>
-              <a:rPr lang="en-US" sz="2000" dirty="0"/>
-              <a:t>We replaced the ‘\N’ characters with an empty value to apply the </a:t>
-            </a:r>
-            <a:r>
-              <a:rPr lang="en-US" sz="2000" dirty="0" err="1"/>
-              <a:t>mongoDB</a:t>
-            </a:r>
-            <a:r>
-              <a:rPr lang="en-US" sz="2000" dirty="0"/>
-              <a:t> </a:t>
-            </a:r>
-            <a:r>
-              <a:rPr lang="en-US" sz="2000" dirty="0" err="1"/>
-              <a:t>schemaless</a:t>
-            </a:r>
-            <a:r>
-              <a:rPr lang="en-US" sz="2000" dirty="0"/>
-              <a:t> property. </a:t>
-            </a:r>
-            <a:endParaRPr lang="it-IT" sz="2000" dirty="0"/>
-          </a:p>
-        </p:txBody>
-      </p:sp>
-      <p:pic>
-        <p:nvPicPr>
-          <p:cNvPr id="7" name="Immagine 6" descr="Immagine che contiene testo, schermata, Carattere, software&#10;&#10;Descrizione generata automaticamente">
-            <a:extLst>
-              <a:ext uri="{FF2B5EF4-FFF2-40B4-BE49-F238E27FC236}">
-                <a16:creationId xmlns:a16="http://schemas.microsoft.com/office/drawing/2014/main" id="{65BD9C2E-13E3-2959-B6CA-32BB24AF046E}"/>
-              </a:ext>
-            </a:extLst>
-          </p:cNvPr>
-          <p:cNvPicPr>
-            <a:picLocks noChangeAspect="1"/>
-          </p:cNvPicPr>
-          <p:nvPr/>
-        </p:nvPicPr>
-        <p:blipFill>
-          <a:blip r:embed="rId3"/>
-          <a:stretch>
-            <a:fillRect/>
-          </a:stretch>
-        </p:blipFill>
-        <p:spPr>
-          <a:xfrm>
-            <a:off x="1535167" y="2043714"/>
-            <a:ext cx="6073666" cy="2751058"/>
-          </a:xfrm>
-          <a:prstGeom prst="rect">
-            <a:avLst/>
-          </a:prstGeom>
-        </p:spPr>
-      </p:pic>
-    </p:spTree>
-    <p:extLst>
-      <p:ext uri="{BB962C8B-B14F-4D97-AF65-F5344CB8AC3E}">
-        <p14:creationId xmlns:p14="http://schemas.microsoft.com/office/powerpoint/2010/main" val="3104338970"/>
-      </p:ext>
-    </p:extLst>
-  </p:cSld>
-  <p:clrMapOvr>
-    <a:masterClrMapping/>
-  </p:clrMapOvr>
-  <mc:AlternateContent xmlns:mc="http://schemas.openxmlformats.org/markup-compatibility/2006" xmlns:p14="http://schemas.microsoft.com/office/powerpoint/2010/main">
-    <mc:Choice Requires="p14">
-      <p:transition spd="med" p14:dur="700">
-        <p:fade/>
-      </p:transition>
-    </mc:Choice>
-    <mc:Fallback xmlns="">
-      <p:transition spd="med">
-        <p:fade/>
-      </p:transition>
-    </mc:Fallback>
-  </mc:AlternateContent>
-  <p:timing>
-    <p:tnLst>
-      <p:par>
-        <p:cTn id="1" dur="indefinite" restart="never" nodeType="tmRoot">
-          <p:childTnLst>
-            <p:seq concurrent="1" nextAc="seek">
-              <p:cTn id="2" dur="indefinite" nodeType="mainSeq">
-                <p:childTnLst>
-                  <p:par>
-                    <p:cTn id="3" fill="hold">
-                      <p:stCondLst>
-                        <p:cond delay="indefinite"/>
-                        <p:cond evt="onBegin" delay="0">
-                          <p:tn val="2"/>
-                        </p:cond>
-                      </p:stCondLst>
-                      <p:childTnLst>
-                        <p:par>
-                          <p:cTn id="4" fill="hold">
-                            <p:stCondLst>
-                              <p:cond delay="0"/>
-                            </p:stCondLst>
-                            <p:childTnLst>
-                              <p:par>
-                                <p:cTn id="5" presetID="10" presetClass="entr" presetSubtype="0" fill="hold" nodeType="withEffect">
-                                  <p:stCondLst>
-                                    <p:cond delay="0"/>
-                                  </p:stCondLst>
-                                  <p:childTnLst>
-                                    <p:set>
-                                      <p:cBhvr>
-                                        <p:cTn id="6" dur="1" fill="hold">
-                                          <p:stCondLst>
-                                            <p:cond delay="0"/>
-                                          </p:stCondLst>
-                                        </p:cTn>
-                                        <p:tgtEl>
-                                          <p:spTgt spid="7"/>
-                                        </p:tgtEl>
-                                        <p:attrNameLst>
-                                          <p:attrName>style.visibility</p:attrName>
-                                        </p:attrNameLst>
-                                      </p:cBhvr>
-                                      <p:to>
-                                        <p:strVal val="visible"/>
-                                      </p:to>
-                                    </p:set>
-                                    <p:animEffect transition="in" filter="fade">
-                                      <p:cBhvr>
-                                        <p:cTn id="7" dur="500"/>
-                                        <p:tgtEl>
-                                          <p:spTgt spid="7"/>
-                                        </p:tgtEl>
-                                      </p:cBhvr>
-                                    </p:animEffect>
-                                  </p:childTnLst>
-                                </p:cTn>
-                              </p:par>
-                            </p:childTnLst>
-                          </p:cTn>
-                        </p:par>
-                      </p:childTnLst>
-                    </p:cTn>
-                  </p:par>
-                </p:childTnLst>
-              </p:cTn>
-              <p:prevCondLst>
-                <p:cond evt="onPrev" delay="0">
-                  <p:tgtEl>
-                    <p:sldTgt/>
-                  </p:tgtEl>
-                </p:cond>
-              </p:prevCondLst>
-              <p:nextCondLst>
-                <p:cond evt="onNext" delay="0">
-                  <p:tgtEl>
-                    <p:sldTgt/>
-                  </p:tgtEl>
-                </p:cond>
-              </p:nextCondLst>
-            </p:seq>
-          </p:childTnLst>
-        </p:cTn>
-      </p:par>
-    </p:tnLst>
-  </p:timing>
-</p:sld>
-</file>
-
 <file path=ppt/slides/slide9.xml><?xml version="1.0" encoding="utf-8"?>
 <p:sld xmlns:a="http://schemas.openxmlformats.org/drawingml/2006/main" xmlns:r="http://schemas.openxmlformats.org/officeDocument/2006/relationships" xmlns:p="http://schemas.openxmlformats.org/presentationml/2006/main">
   <p:cSld>
@@ -27442,6 +28729,125 @@
           <a:chExt cx="0" cy="0"/>
         </a:xfrm>
       </p:grpSpPr>
+      <p:grpSp>
+        <p:nvGrpSpPr>
+          <p:cNvPr id="1453" name="Google Shape;1453;p36"/>
+          <p:cNvGrpSpPr/>
+          <p:nvPr/>
+        </p:nvGrpSpPr>
+        <p:grpSpPr>
+          <a:xfrm>
+            <a:off x="1121475" y="3843025"/>
+            <a:ext cx="1221300" cy="570400"/>
+            <a:chOff x="670175" y="3809850"/>
+            <a:chExt cx="1221300" cy="570400"/>
+          </a:xfrm>
+        </p:grpSpPr>
+        <p:cxnSp>
+          <p:nvCxnSpPr>
+            <p:cNvPr id="1454" name="Google Shape;1454;p36"/>
+            <p:cNvCxnSpPr/>
+            <p:nvPr/>
+          </p:nvCxnSpPr>
+          <p:spPr>
+            <a:xfrm rot="10800000">
+              <a:off x="670175" y="3999983"/>
+              <a:ext cx="1221300" cy="0"/>
+            </a:xfrm>
+            <a:prstGeom prst="straightConnector1">
+              <a:avLst/>
+            </a:prstGeom>
+            <a:noFill/>
+            <a:ln w="9525" cap="flat" cmpd="sng">
+              <a:solidFill>
+                <a:schemeClr val="dk2"/>
+              </a:solidFill>
+              <a:prstDash val="solid"/>
+              <a:round/>
+              <a:headEnd type="none" w="med" len="med"/>
+              <a:tailEnd type="none" w="med" len="med"/>
+            </a:ln>
+          </p:spPr>
+        </p:cxnSp>
+        <p:cxnSp>
+          <p:nvCxnSpPr>
+            <p:cNvPr id="1455" name="Google Shape;1455;p36"/>
+            <p:cNvCxnSpPr/>
+            <p:nvPr/>
+          </p:nvCxnSpPr>
+          <p:spPr>
+            <a:xfrm rot="10800000">
+              <a:off x="670175" y="4380250"/>
+              <a:ext cx="1221300" cy="0"/>
+            </a:xfrm>
+            <a:prstGeom prst="straightConnector1">
+              <a:avLst/>
+            </a:prstGeom>
+            <a:noFill/>
+            <a:ln w="9525" cap="flat" cmpd="sng">
+              <a:solidFill>
+                <a:schemeClr val="dk2"/>
+              </a:solidFill>
+              <a:prstDash val="solid"/>
+              <a:round/>
+              <a:headEnd type="none" w="med" len="med"/>
+              <a:tailEnd type="none" w="med" len="med"/>
+            </a:ln>
+          </p:spPr>
+        </p:cxnSp>
+        <p:cxnSp>
+          <p:nvCxnSpPr>
+            <p:cNvPr id="1456" name="Google Shape;1456;p36"/>
+            <p:cNvCxnSpPr/>
+            <p:nvPr/>
+          </p:nvCxnSpPr>
+          <p:spPr>
+            <a:xfrm rot="10800000">
+              <a:off x="995525" y="4190117"/>
+              <a:ext cx="570600" cy="0"/>
+            </a:xfrm>
+            <a:prstGeom prst="straightConnector1">
+              <a:avLst/>
+            </a:prstGeom>
+            <a:noFill/>
+            <a:ln w="9525" cap="flat" cmpd="sng">
+              <a:solidFill>
+                <a:schemeClr val="dk2"/>
+              </a:solidFill>
+              <a:prstDash val="solid"/>
+              <a:round/>
+              <a:headEnd type="none" w="med" len="med"/>
+              <a:tailEnd type="none" w="med" len="med"/>
+            </a:ln>
+          </p:spPr>
+        </p:cxnSp>
+        <p:cxnSp>
+          <p:nvCxnSpPr>
+            <p:cNvPr id="1457" name="Google Shape;1457;p36"/>
+            <p:cNvCxnSpPr/>
+            <p:nvPr/>
+          </p:nvCxnSpPr>
+          <p:spPr>
+            <a:xfrm rot="10800000">
+              <a:off x="995525" y="3809850"/>
+              <a:ext cx="570600" cy="0"/>
+            </a:xfrm>
+            <a:prstGeom prst="straightConnector1">
+              <a:avLst/>
+            </a:prstGeom>
+            <a:noFill/>
+            <a:ln w="9525" cap="flat" cmpd="sng">
+              <a:solidFill>
+                <a:schemeClr val="dk2"/>
+              </a:solidFill>
+              <a:prstDash val="solid"/>
+              <a:round/>
+              <a:headEnd type="none" w="med" len="med"/>
+              <a:tailEnd type="none" w="med" len="med"/>
+            </a:ln>
+          </p:spPr>
+        </p:cxnSp>
+      </p:grpSp>
       <p:sp>
         <p:nvSpPr>
           <p:cNvPr id="1459" name="Google Shape;1459;p36"/>
@@ -27477,10 +28883,17 @@
               <a:buNone/>
             </a:pPr>
             <a:r>
-              <a:rPr lang="en"/>
-              <a:t>MongoDB</a:t>
+              <a:rPr lang="en" dirty="0"/>
+              <a:t>Preprocessing</a:t>
             </a:r>
-            <a:endParaRPr/>
+            <a:br>
+              <a:rPr lang="en" dirty="0"/>
+            </a:br>
+            <a:r>
+              <a:rPr lang="en" sz="1400" dirty="0"/>
+              <a:t>Data cleaning</a:t>
+            </a:r>
+            <a:endParaRPr sz="1400" dirty="0"/>
           </a:p>
         </p:txBody>
       </p:sp>
@@ -27520,7 +28933,7 @@
             </a:pPr>
             <a:r>
               <a:rPr lang="en" sz="3500"/>
-              <a:t>03</a:t>
+              <a:t>02</a:t>
             </a:r>
             <a:endParaRPr sz="3500"/>
           </a:p>
@@ -27528,19 +28941,13 @@
       </p:sp>
       <p:sp>
         <p:nvSpPr>
-          <p:cNvPr id="8" name="Google Shape;1474;p37">
-            <a:extLst>
-              <a:ext uri="{FF2B5EF4-FFF2-40B4-BE49-F238E27FC236}">
-                <a16:creationId xmlns:a16="http://schemas.microsoft.com/office/drawing/2014/main" id="{D96CA941-1005-1A01-388E-287269220C9B}"/>
-              </a:ext>
-            </a:extLst>
-          </p:cNvPr>
+          <p:cNvPr id="1462" name="Google Shape;1462;p36"/>
           <p:cNvSpPr/>
           <p:nvPr/>
         </p:nvSpPr>
         <p:spPr>
-          <a:xfrm flipH="1">
-            <a:off x="995525" y="4698850"/>
+          <a:xfrm>
+            <a:off x="995550" y="4698850"/>
             <a:ext cx="7152900" cy="172500"/>
           </a:xfrm>
           <a:prstGeom prst="ellipse">
@@ -27576,189 +28983,10 @@
       </p:sp>
       <p:pic>
         <p:nvPicPr>
-          <p:cNvPr id="10" name="Immagine 9" descr="Immagine che contiene verde, creatività, arte&#10;&#10;Descrizione generata automaticamente">
+          <p:cNvPr id="2" name="Google Shape;1413;p32">
             <a:extLst>
               <a:ext uri="{FF2B5EF4-FFF2-40B4-BE49-F238E27FC236}">
-                <a16:creationId xmlns:a16="http://schemas.microsoft.com/office/drawing/2014/main" id="{C5FD9A4B-8704-60EF-EE4E-8E3EA7CE5E0C}"/>
-              </a:ext>
-            </a:extLst>
-          </p:cNvPr>
-          <p:cNvPicPr>
-            <a:picLocks noChangeAspect="1"/>
-          </p:cNvPicPr>
-          <p:nvPr/>
-        </p:nvPicPr>
-        <p:blipFill>
-          <a:blip r:embed="rId3"/>
-          <a:stretch>
-            <a:fillRect/>
-          </a:stretch>
-        </p:blipFill>
-        <p:spPr>
-          <a:xfrm>
-            <a:off x="5390430" y="1241332"/>
-            <a:ext cx="668100" cy="668100"/>
-          </a:xfrm>
-          <a:prstGeom prst="rect">
-            <a:avLst/>
-          </a:prstGeom>
-        </p:spPr>
-      </p:pic>
-      <p:grpSp>
-        <p:nvGrpSpPr>
-          <p:cNvPr id="2" name="Google Shape;1920;p57">
-            <a:extLst>
-              <a:ext uri="{FF2B5EF4-FFF2-40B4-BE49-F238E27FC236}">
-                <a16:creationId xmlns:a16="http://schemas.microsoft.com/office/drawing/2014/main" id="{D44D42C0-0654-8EBA-2555-F678458E2205}"/>
-              </a:ext>
-            </a:extLst>
-          </p:cNvPr>
-          <p:cNvGrpSpPr/>
-          <p:nvPr/>
-        </p:nvGrpSpPr>
-        <p:grpSpPr>
-          <a:xfrm>
-            <a:off x="1121475" y="3843025"/>
-            <a:ext cx="1221300" cy="570400"/>
-            <a:chOff x="670175" y="3809850"/>
-            <a:chExt cx="1221300" cy="570400"/>
-          </a:xfrm>
-        </p:grpSpPr>
-        <p:cxnSp>
-          <p:nvCxnSpPr>
-            <p:cNvPr id="11" name="Google Shape;1921;p57">
-              <a:extLst>
-                <a:ext uri="{FF2B5EF4-FFF2-40B4-BE49-F238E27FC236}">
-                  <a16:creationId xmlns:a16="http://schemas.microsoft.com/office/drawing/2014/main" id="{61F3F36F-D7AF-3D72-0A51-E4890D75B04B}"/>
-                </a:ext>
-              </a:extLst>
-            </p:cNvPr>
-            <p:cNvCxnSpPr/>
-            <p:nvPr/>
-          </p:nvCxnSpPr>
-          <p:spPr>
-            <a:xfrm rot="10800000">
-              <a:off x="670175" y="3999983"/>
-              <a:ext cx="1221300" cy="0"/>
-            </a:xfrm>
-            <a:prstGeom prst="straightConnector1">
-              <a:avLst/>
-            </a:prstGeom>
-            <a:noFill/>
-            <a:ln w="9525" cap="flat" cmpd="sng">
-              <a:solidFill>
-                <a:schemeClr val="dk2"/>
-              </a:solidFill>
-              <a:prstDash val="solid"/>
-              <a:round/>
-              <a:headEnd type="none" w="med" len="med"/>
-              <a:tailEnd type="none" w="med" len="med"/>
-            </a:ln>
-          </p:spPr>
-        </p:cxnSp>
-        <p:cxnSp>
-          <p:nvCxnSpPr>
-            <p:cNvPr id="12" name="Google Shape;1922;p57">
-              <a:extLst>
-                <a:ext uri="{FF2B5EF4-FFF2-40B4-BE49-F238E27FC236}">
-                  <a16:creationId xmlns:a16="http://schemas.microsoft.com/office/drawing/2014/main" id="{F5FD9E87-D90C-2DD4-589B-6C235BF5A06E}"/>
-                </a:ext>
-              </a:extLst>
-            </p:cNvPr>
-            <p:cNvCxnSpPr/>
-            <p:nvPr/>
-          </p:nvCxnSpPr>
-          <p:spPr>
-            <a:xfrm rot="10800000">
-              <a:off x="670175" y="4380250"/>
-              <a:ext cx="1221300" cy="0"/>
-            </a:xfrm>
-            <a:prstGeom prst="straightConnector1">
-              <a:avLst/>
-            </a:prstGeom>
-            <a:noFill/>
-            <a:ln w="9525" cap="flat" cmpd="sng">
-              <a:solidFill>
-                <a:schemeClr val="dk2"/>
-              </a:solidFill>
-              <a:prstDash val="solid"/>
-              <a:round/>
-              <a:headEnd type="none" w="med" len="med"/>
-              <a:tailEnd type="none" w="med" len="med"/>
-            </a:ln>
-          </p:spPr>
-        </p:cxnSp>
-        <p:cxnSp>
-          <p:nvCxnSpPr>
-            <p:cNvPr id="13" name="Google Shape;1923;p57">
-              <a:extLst>
-                <a:ext uri="{FF2B5EF4-FFF2-40B4-BE49-F238E27FC236}">
-                  <a16:creationId xmlns:a16="http://schemas.microsoft.com/office/drawing/2014/main" id="{A341A0E5-88B7-40C6-71F4-F287B6DACFA1}"/>
-                </a:ext>
-              </a:extLst>
-            </p:cNvPr>
-            <p:cNvCxnSpPr/>
-            <p:nvPr/>
-          </p:nvCxnSpPr>
-          <p:spPr>
-            <a:xfrm rot="10800000">
-              <a:off x="995525" y="4190117"/>
-              <a:ext cx="570600" cy="0"/>
-            </a:xfrm>
-            <a:prstGeom prst="straightConnector1">
-              <a:avLst/>
-            </a:prstGeom>
-            <a:noFill/>
-            <a:ln w="9525" cap="flat" cmpd="sng">
-              <a:solidFill>
-                <a:schemeClr val="dk2"/>
-              </a:solidFill>
-              <a:prstDash val="solid"/>
-              <a:round/>
-              <a:headEnd type="none" w="med" len="med"/>
-              <a:tailEnd type="none" w="med" len="med"/>
-            </a:ln>
-          </p:spPr>
-        </p:cxnSp>
-        <p:cxnSp>
-          <p:nvCxnSpPr>
-            <p:cNvPr id="14" name="Google Shape;1924;p57">
-              <a:extLst>
-                <a:ext uri="{FF2B5EF4-FFF2-40B4-BE49-F238E27FC236}">
-                  <a16:creationId xmlns:a16="http://schemas.microsoft.com/office/drawing/2014/main" id="{6C790D01-5FC3-BFFF-D0CA-1CE3C420D74C}"/>
-                </a:ext>
-              </a:extLst>
-            </p:cNvPr>
-            <p:cNvCxnSpPr/>
-            <p:nvPr/>
-          </p:nvCxnSpPr>
-          <p:spPr>
-            <a:xfrm rot="10800000">
-              <a:off x="995525" y="3809850"/>
-              <a:ext cx="570600" cy="0"/>
-            </a:xfrm>
-            <a:prstGeom prst="straightConnector1">
-              <a:avLst/>
-            </a:prstGeom>
-            <a:noFill/>
-            <a:ln w="9525" cap="flat" cmpd="sng">
-              <a:solidFill>
-                <a:schemeClr val="dk2"/>
-              </a:solidFill>
-              <a:prstDash val="solid"/>
-              <a:round/>
-              <a:headEnd type="none" w="med" len="med"/>
-              <a:tailEnd type="none" w="med" len="med"/>
-            </a:ln>
-          </p:spPr>
-        </p:cxnSp>
-      </p:grpSp>
-      <p:pic>
-        <p:nvPicPr>
-          <p:cNvPr id="9" name="Google Shape;1475;p37">
-            <a:extLst>
-              <a:ext uri="{FF2B5EF4-FFF2-40B4-BE49-F238E27FC236}">
-                <a16:creationId xmlns:a16="http://schemas.microsoft.com/office/drawing/2014/main" id="{3FC8542E-0F60-A41E-E025-174A12F7A036}"/>
+                <a16:creationId xmlns:a16="http://schemas.microsoft.com/office/drawing/2014/main" id="{EF3384D1-79E9-515C-3847-64A47004E79B}"/>
               </a:ext>
             </a:extLst>
           </p:cNvPr>
@@ -27766,16 +28994,16 @@
           <p:nvPr/>
         </p:nvPicPr>
         <p:blipFill rotWithShape="1">
-          <a:blip r:embed="rId4">
+          <a:blip r:embed="rId3">
             <a:alphaModFix/>
           </a:blip>
-          <a:srcRect l="3157" b="22039"/>
+          <a:srcRect l="2922" t="3652" b="22262"/>
           <a:stretch/>
         </p:blipFill>
         <p:spPr>
           <a:xfrm>
-            <a:off x="2267563" y="3721675"/>
-            <a:ext cx="4608825" cy="1107475"/>
+            <a:off x="2260800" y="3793925"/>
+            <a:ext cx="4622403" cy="1035226"/>
           </a:xfrm>
           <a:prstGeom prst="rect">
             <a:avLst/>
@@ -27786,10 +29014,40 @@
           </a:ln>
         </p:spPr>
       </p:pic>
+      <p:pic>
+        <p:nvPicPr>
+          <p:cNvPr id="3" name="Immagine 2" descr="Immagine che contiene clipart, Elementi grafici, simbolo, cartone animato&#10;&#10;Descrizione generata automaticamente">
+            <a:extLst>
+              <a:ext uri="{FF2B5EF4-FFF2-40B4-BE49-F238E27FC236}">
+                <a16:creationId xmlns:a16="http://schemas.microsoft.com/office/drawing/2014/main" id="{4319263B-8DA3-47B5-42B0-AFB8D204D555}"/>
+              </a:ext>
+            </a:extLst>
+          </p:cNvPr>
+          <p:cNvPicPr>
+            <a:picLocks noChangeAspect="1"/>
+          </p:cNvPicPr>
+          <p:nvPr/>
+        </p:nvPicPr>
+        <p:blipFill>
+          <a:blip r:embed="rId4"/>
+          <a:stretch>
+            <a:fillRect/>
+          </a:stretch>
+        </p:blipFill>
+        <p:spPr>
+          <a:xfrm>
+            <a:off x="7858654" y="685191"/>
+            <a:ext cx="579592" cy="634761"/>
+          </a:xfrm>
+          <a:prstGeom prst="rect">
+            <a:avLst/>
+          </a:prstGeom>
+        </p:spPr>
+      </p:pic>
     </p:spTree>
     <p:extLst>
       <p:ext uri="{BB962C8B-B14F-4D97-AF65-F5344CB8AC3E}">
-        <p14:creationId xmlns:p14="http://schemas.microsoft.com/office/powerpoint/2010/main" val="636184350"/>
+        <p14:creationId xmlns:p14="http://schemas.microsoft.com/office/powerpoint/2010/main" val="1080305567"/>
       </p:ext>
     </p:extLst>
   </p:cSld>
@@ -27880,7 +29138,7 @@
                                           </p:stCondLst>
                                         </p:cTn>
                                         <p:tgtEl>
-                                          <p:spTgt spid="9"/>
+                                          <p:spTgt spid="1453"/>
                                         </p:tgtEl>
                                         <p:attrNameLst>
                                           <p:attrName>style.visibility</p:attrName>
@@ -27894,7 +29152,7 @@
                                       <p:cBhvr additive="base">
                                         <p:cTn id="10" dur="500" fill="hold"/>
                                         <p:tgtEl>
-                                          <p:spTgt spid="9"/>
+                                          <p:spTgt spid="1453"/>
                                         </p:tgtEl>
                                         <p:attrNameLst>
                                           <p:attrName>ppt_x</p:attrName>
@@ -27917,7 +29175,7 @@
                                       <p:cBhvr additive="base">
                                         <p:cTn id="11" dur="500" fill="hold"/>
                                         <p:tgtEl>
-                                          <p:spTgt spid="9"/>
+                                          <p:spTgt spid="1453"/>
                                         </p:tgtEl>
                                         <p:attrNameLst>
                                           <p:attrName>ppt_y</p:attrName>

</xml_diff>